<commit_message>
updating user federation section
</commit_message>
<xml_diff>
--- a/documentation/images/easyfranchise-identity-diagrams.pptx
+++ b/documentation/images/easyfranchise-identity-diagrams.pptx
@@ -4,9 +4,16 @@
   <p:sldMasterIdLst>
     <p:sldMasterId id="2147483648" r:id="rId1"/>
   </p:sldMasterIdLst>
+  <p:notesMasterIdLst>
+    <p:notesMasterId r:id="rId8"/>
+  </p:notesMasterIdLst>
   <p:sldIdLst>
     <p:sldId id="256" r:id="rId2"/>
     <p:sldId id="260" r:id="rId3"/>
+    <p:sldId id="261" r:id="rId4"/>
+    <p:sldId id="262" r:id="rId5"/>
+    <p:sldId id="263" r:id="rId6"/>
+    <p:sldId id="264" r:id="rId7"/>
   </p:sldIdLst>
   <p:sldSz cx="12192000" cy="6858000"/>
   <p:notesSz cx="6858000" cy="9144000"/>
@@ -113,6 +120,440 @@
 </p:presentation>
 </file>
 
+<file path=ppt/notesMasters/notesMaster1.xml><?xml version="1.0" encoding="utf-8"?>
+<p:notesMaster xmlns:a="http://schemas.openxmlformats.org/drawingml/2006/main" xmlns:r="http://schemas.openxmlformats.org/officeDocument/2006/relationships" xmlns:p="http://schemas.openxmlformats.org/presentationml/2006/main">
+  <p:cSld>
+    <p:bg>
+      <p:bgRef idx="1001">
+        <a:schemeClr val="bg1"/>
+      </p:bgRef>
+    </p:bg>
+    <p:spTree>
+      <p:nvGrpSpPr>
+        <p:cNvPr id="1" name=""/>
+        <p:cNvGrpSpPr/>
+        <p:nvPr/>
+      </p:nvGrpSpPr>
+      <p:grpSpPr>
+        <a:xfrm>
+          <a:off x="0" y="0"/>
+          <a:ext cx="0" cy="0"/>
+          <a:chOff x="0" y="0"/>
+          <a:chExt cx="0" cy="0"/>
+        </a:xfrm>
+      </p:grpSpPr>
+      <p:sp>
+        <p:nvSpPr>
+          <p:cNvPr id="2" name="Header Placeholder 1"/>
+          <p:cNvSpPr>
+            <a:spLocks noGrp="1"/>
+          </p:cNvSpPr>
+          <p:nvPr>
+            <p:ph type="hdr" sz="quarter"/>
+          </p:nvPr>
+        </p:nvSpPr>
+        <p:spPr>
+          <a:xfrm>
+            <a:off x="0" y="0"/>
+            <a:ext cx="2971800" cy="458788"/>
+          </a:xfrm>
+          <a:prstGeom prst="rect">
+            <a:avLst/>
+          </a:prstGeom>
+        </p:spPr>
+        <p:txBody>
+          <a:bodyPr vert="horz" lIns="91440" tIns="45720" rIns="91440" bIns="45720" rtlCol="0"/>
+          <a:lstStyle>
+            <a:lvl1pPr algn="l">
+              <a:defRPr sz="1200"/>
+            </a:lvl1pPr>
+          </a:lstStyle>
+          <a:p>
+            <a:endParaRPr lang="en-DE"/>
+          </a:p>
+        </p:txBody>
+      </p:sp>
+      <p:sp>
+        <p:nvSpPr>
+          <p:cNvPr id="3" name="Date Placeholder 2"/>
+          <p:cNvSpPr>
+            <a:spLocks noGrp="1"/>
+          </p:cNvSpPr>
+          <p:nvPr>
+            <p:ph type="dt" idx="1"/>
+          </p:nvPr>
+        </p:nvSpPr>
+        <p:spPr>
+          <a:xfrm>
+            <a:off x="3884613" y="0"/>
+            <a:ext cx="2971800" cy="458788"/>
+          </a:xfrm>
+          <a:prstGeom prst="rect">
+            <a:avLst/>
+          </a:prstGeom>
+        </p:spPr>
+        <p:txBody>
+          <a:bodyPr vert="horz" lIns="91440" tIns="45720" rIns="91440" bIns="45720" rtlCol="0"/>
+          <a:lstStyle>
+            <a:lvl1pPr algn="r">
+              <a:defRPr sz="1200"/>
+            </a:lvl1pPr>
+          </a:lstStyle>
+          <a:p>
+            <a:fld id="{405AB75F-762F-7444-9F21-EA1C7BD0BBDF}" type="datetimeFigureOut">
+              <a:rPr lang="en-DE" smtClean="0"/>
+              <a:t>11.07.22</a:t>
+            </a:fld>
+            <a:endParaRPr lang="en-DE"/>
+          </a:p>
+        </p:txBody>
+      </p:sp>
+      <p:sp>
+        <p:nvSpPr>
+          <p:cNvPr id="4" name="Slide Image Placeholder 3"/>
+          <p:cNvSpPr>
+            <a:spLocks noGrp="1" noRot="1" noChangeAspect="1"/>
+          </p:cNvSpPr>
+          <p:nvPr>
+            <p:ph type="sldImg" idx="2"/>
+          </p:nvPr>
+        </p:nvSpPr>
+        <p:spPr>
+          <a:xfrm>
+            <a:off x="685800" y="1143000"/>
+            <a:ext cx="5486400" cy="3086100"/>
+          </a:xfrm>
+          <a:prstGeom prst="rect">
+            <a:avLst/>
+          </a:prstGeom>
+          <a:noFill/>
+          <a:ln w="12700">
+            <a:solidFill>
+              <a:prstClr val="black"/>
+            </a:solidFill>
+          </a:ln>
+        </p:spPr>
+        <p:txBody>
+          <a:bodyPr vert="horz" lIns="91440" tIns="45720" rIns="91440" bIns="45720" rtlCol="0" anchor="ctr"/>
+          <a:lstStyle/>
+          <a:p>
+            <a:endParaRPr lang="en-DE"/>
+          </a:p>
+        </p:txBody>
+      </p:sp>
+      <p:sp>
+        <p:nvSpPr>
+          <p:cNvPr id="5" name="Notes Placeholder 4"/>
+          <p:cNvSpPr>
+            <a:spLocks noGrp="1"/>
+          </p:cNvSpPr>
+          <p:nvPr>
+            <p:ph type="body" sz="quarter" idx="3"/>
+          </p:nvPr>
+        </p:nvSpPr>
+        <p:spPr>
+          <a:xfrm>
+            <a:off x="685800" y="4400550"/>
+            <a:ext cx="5486400" cy="3600450"/>
+          </a:xfrm>
+          <a:prstGeom prst="rect">
+            <a:avLst/>
+          </a:prstGeom>
+        </p:spPr>
+        <p:txBody>
+          <a:bodyPr vert="horz" lIns="91440" tIns="45720" rIns="91440" bIns="45720" rtlCol="0"/>
+          <a:lstStyle/>
+          <a:p>
+            <a:pPr lvl="0"/>
+            <a:r>
+              <a:rPr lang="en-GB"/>
+              <a:t>Click to edit Master text styles</a:t>
+            </a:r>
+          </a:p>
+          <a:p>
+            <a:pPr lvl="1"/>
+            <a:r>
+              <a:rPr lang="en-GB"/>
+              <a:t>Second level</a:t>
+            </a:r>
+          </a:p>
+          <a:p>
+            <a:pPr lvl="2"/>
+            <a:r>
+              <a:rPr lang="en-GB"/>
+              <a:t>Third level</a:t>
+            </a:r>
+          </a:p>
+          <a:p>
+            <a:pPr lvl="3"/>
+            <a:r>
+              <a:rPr lang="en-GB"/>
+              <a:t>Fourth level</a:t>
+            </a:r>
+          </a:p>
+          <a:p>
+            <a:pPr lvl="4"/>
+            <a:r>
+              <a:rPr lang="en-GB"/>
+              <a:t>Fifth level</a:t>
+            </a:r>
+            <a:endParaRPr lang="en-DE"/>
+          </a:p>
+        </p:txBody>
+      </p:sp>
+      <p:sp>
+        <p:nvSpPr>
+          <p:cNvPr id="6" name="Footer Placeholder 5"/>
+          <p:cNvSpPr>
+            <a:spLocks noGrp="1"/>
+          </p:cNvSpPr>
+          <p:nvPr>
+            <p:ph type="ftr" sz="quarter" idx="4"/>
+          </p:nvPr>
+        </p:nvSpPr>
+        <p:spPr>
+          <a:xfrm>
+            <a:off x="0" y="8685213"/>
+            <a:ext cx="2971800" cy="458787"/>
+          </a:xfrm>
+          <a:prstGeom prst="rect">
+            <a:avLst/>
+          </a:prstGeom>
+        </p:spPr>
+        <p:txBody>
+          <a:bodyPr vert="horz" lIns="91440" tIns="45720" rIns="91440" bIns="45720" rtlCol="0" anchor="b"/>
+          <a:lstStyle>
+            <a:lvl1pPr algn="l">
+              <a:defRPr sz="1200"/>
+            </a:lvl1pPr>
+          </a:lstStyle>
+          <a:p>
+            <a:endParaRPr lang="en-DE"/>
+          </a:p>
+        </p:txBody>
+      </p:sp>
+      <p:sp>
+        <p:nvSpPr>
+          <p:cNvPr id="7" name="Slide Number Placeholder 6"/>
+          <p:cNvSpPr>
+            <a:spLocks noGrp="1"/>
+          </p:cNvSpPr>
+          <p:nvPr>
+            <p:ph type="sldNum" sz="quarter" idx="5"/>
+          </p:nvPr>
+        </p:nvSpPr>
+        <p:spPr>
+          <a:xfrm>
+            <a:off x="3884613" y="8685213"/>
+            <a:ext cx="2971800" cy="458787"/>
+          </a:xfrm>
+          <a:prstGeom prst="rect">
+            <a:avLst/>
+          </a:prstGeom>
+        </p:spPr>
+        <p:txBody>
+          <a:bodyPr vert="horz" lIns="91440" tIns="45720" rIns="91440" bIns="45720" rtlCol="0" anchor="b"/>
+          <a:lstStyle>
+            <a:lvl1pPr algn="r">
+              <a:defRPr sz="1200"/>
+            </a:lvl1pPr>
+          </a:lstStyle>
+          <a:p>
+            <a:fld id="{5672A60F-F9CD-404A-B386-A623CCB90095}" type="slidenum">
+              <a:rPr lang="en-DE" smtClean="0"/>
+              <a:t>‹#›</a:t>
+            </a:fld>
+            <a:endParaRPr lang="en-DE"/>
+          </a:p>
+        </p:txBody>
+      </p:sp>
+    </p:spTree>
+    <p:extLst>
+      <p:ext uri="{BB962C8B-B14F-4D97-AF65-F5344CB8AC3E}">
+        <p14:creationId xmlns:p14="http://schemas.microsoft.com/office/powerpoint/2010/main" val="655342863"/>
+      </p:ext>
+    </p:extLst>
+  </p:cSld>
+  <p:clrMap bg1="lt1" tx1="dk1" bg2="lt2" tx2="dk2" accent1="accent1" accent2="accent2" accent3="accent3" accent4="accent4" accent5="accent5" accent6="accent6" hlink="hlink" folHlink="folHlink"/>
+  <p:notesStyle>
+    <a:lvl1pPr marL="0" algn="l" defTabSz="914400" rtl="0" eaLnBrk="1" latinLnBrk="0" hangingPunct="1">
+      <a:defRPr sz="1200" kern="1200">
+        <a:solidFill>
+          <a:schemeClr val="tx1"/>
+        </a:solidFill>
+        <a:latin typeface="+mn-lt"/>
+        <a:ea typeface="+mn-ea"/>
+        <a:cs typeface="+mn-cs"/>
+      </a:defRPr>
+    </a:lvl1pPr>
+    <a:lvl2pPr marL="457200" algn="l" defTabSz="914400" rtl="0" eaLnBrk="1" latinLnBrk="0" hangingPunct="1">
+      <a:defRPr sz="1200" kern="1200">
+        <a:solidFill>
+          <a:schemeClr val="tx1"/>
+        </a:solidFill>
+        <a:latin typeface="+mn-lt"/>
+        <a:ea typeface="+mn-ea"/>
+        <a:cs typeface="+mn-cs"/>
+      </a:defRPr>
+    </a:lvl2pPr>
+    <a:lvl3pPr marL="914400" algn="l" defTabSz="914400" rtl="0" eaLnBrk="1" latinLnBrk="0" hangingPunct="1">
+      <a:defRPr sz="1200" kern="1200">
+        <a:solidFill>
+          <a:schemeClr val="tx1"/>
+        </a:solidFill>
+        <a:latin typeface="+mn-lt"/>
+        <a:ea typeface="+mn-ea"/>
+        <a:cs typeface="+mn-cs"/>
+      </a:defRPr>
+    </a:lvl3pPr>
+    <a:lvl4pPr marL="1371600" algn="l" defTabSz="914400" rtl="0" eaLnBrk="1" latinLnBrk="0" hangingPunct="1">
+      <a:defRPr sz="1200" kern="1200">
+        <a:solidFill>
+          <a:schemeClr val="tx1"/>
+        </a:solidFill>
+        <a:latin typeface="+mn-lt"/>
+        <a:ea typeface="+mn-ea"/>
+        <a:cs typeface="+mn-cs"/>
+      </a:defRPr>
+    </a:lvl4pPr>
+    <a:lvl5pPr marL="1828800" algn="l" defTabSz="914400" rtl="0" eaLnBrk="1" latinLnBrk="0" hangingPunct="1">
+      <a:defRPr sz="1200" kern="1200">
+        <a:solidFill>
+          <a:schemeClr val="tx1"/>
+        </a:solidFill>
+        <a:latin typeface="+mn-lt"/>
+        <a:ea typeface="+mn-ea"/>
+        <a:cs typeface="+mn-cs"/>
+      </a:defRPr>
+    </a:lvl5pPr>
+    <a:lvl6pPr marL="2286000" algn="l" defTabSz="914400" rtl="0" eaLnBrk="1" latinLnBrk="0" hangingPunct="1">
+      <a:defRPr sz="1200" kern="1200">
+        <a:solidFill>
+          <a:schemeClr val="tx1"/>
+        </a:solidFill>
+        <a:latin typeface="+mn-lt"/>
+        <a:ea typeface="+mn-ea"/>
+        <a:cs typeface="+mn-cs"/>
+      </a:defRPr>
+    </a:lvl6pPr>
+    <a:lvl7pPr marL="2743200" algn="l" defTabSz="914400" rtl="0" eaLnBrk="1" latinLnBrk="0" hangingPunct="1">
+      <a:defRPr sz="1200" kern="1200">
+        <a:solidFill>
+          <a:schemeClr val="tx1"/>
+        </a:solidFill>
+        <a:latin typeface="+mn-lt"/>
+        <a:ea typeface="+mn-ea"/>
+        <a:cs typeface="+mn-cs"/>
+      </a:defRPr>
+    </a:lvl7pPr>
+    <a:lvl8pPr marL="3200400" algn="l" defTabSz="914400" rtl="0" eaLnBrk="1" latinLnBrk="0" hangingPunct="1">
+      <a:defRPr sz="1200" kern="1200">
+        <a:solidFill>
+          <a:schemeClr val="tx1"/>
+        </a:solidFill>
+        <a:latin typeface="+mn-lt"/>
+        <a:ea typeface="+mn-ea"/>
+        <a:cs typeface="+mn-cs"/>
+      </a:defRPr>
+    </a:lvl8pPr>
+    <a:lvl9pPr marL="3657600" algn="l" defTabSz="914400" rtl="0" eaLnBrk="1" latinLnBrk="0" hangingPunct="1">
+      <a:defRPr sz="1200" kern="1200">
+        <a:solidFill>
+          <a:schemeClr val="tx1"/>
+        </a:solidFill>
+        <a:latin typeface="+mn-lt"/>
+        <a:ea typeface="+mn-ea"/>
+        <a:cs typeface="+mn-cs"/>
+      </a:defRPr>
+    </a:lvl9pPr>
+  </p:notesStyle>
+</p:notesMaster>
+</file>
+
+<file path=ppt/notesSlides/notesSlide1.xml><?xml version="1.0" encoding="utf-8"?>
+<p:notes xmlns:a="http://schemas.openxmlformats.org/drawingml/2006/main" xmlns:r="http://schemas.openxmlformats.org/officeDocument/2006/relationships" xmlns:p="http://schemas.openxmlformats.org/presentationml/2006/main">
+  <p:cSld>
+    <p:spTree>
+      <p:nvGrpSpPr>
+        <p:cNvPr id="1" name=""/>
+        <p:cNvGrpSpPr/>
+        <p:nvPr/>
+      </p:nvGrpSpPr>
+      <p:grpSpPr>
+        <a:xfrm>
+          <a:off x="0" y="0"/>
+          <a:ext cx="0" cy="0"/>
+          <a:chOff x="0" y="0"/>
+          <a:chExt cx="0" cy="0"/>
+        </a:xfrm>
+      </p:grpSpPr>
+      <p:sp>
+        <p:nvSpPr>
+          <p:cNvPr id="2" name="Slide Image Placeholder 1"/>
+          <p:cNvSpPr>
+            <a:spLocks noGrp="1" noRot="1" noChangeAspect="1"/>
+          </p:cNvSpPr>
+          <p:nvPr>
+            <p:ph type="sldImg"/>
+          </p:nvPr>
+        </p:nvSpPr>
+        <p:spPr/>
+      </p:sp>
+      <p:sp>
+        <p:nvSpPr>
+          <p:cNvPr id="3" name="Notes Placeholder 2"/>
+          <p:cNvSpPr>
+            <a:spLocks noGrp="1"/>
+          </p:cNvSpPr>
+          <p:nvPr>
+            <p:ph type="body" idx="1"/>
+          </p:nvPr>
+        </p:nvSpPr>
+        <p:spPr/>
+        <p:txBody>
+          <a:bodyPr/>
+          <a:lstStyle/>
+          <a:p>
+            <a:endParaRPr lang="en-DE" dirty="0"/>
+          </a:p>
+        </p:txBody>
+      </p:sp>
+      <p:sp>
+        <p:nvSpPr>
+          <p:cNvPr id="4" name="Slide Number Placeholder 3"/>
+          <p:cNvSpPr>
+            <a:spLocks noGrp="1"/>
+          </p:cNvSpPr>
+          <p:nvPr>
+            <p:ph type="sldNum" sz="quarter" idx="5"/>
+          </p:nvPr>
+        </p:nvSpPr>
+        <p:spPr/>
+        <p:txBody>
+          <a:bodyPr/>
+          <a:lstStyle/>
+          <a:p>
+            <a:fld id="{5672A60F-F9CD-404A-B386-A623CCB90095}" type="slidenum">
+              <a:rPr lang="en-DE" smtClean="0"/>
+              <a:t>6</a:t>
+            </a:fld>
+            <a:endParaRPr lang="en-DE"/>
+          </a:p>
+        </p:txBody>
+      </p:sp>
+    </p:spTree>
+    <p:extLst>
+      <p:ext uri="{BB962C8B-B14F-4D97-AF65-F5344CB8AC3E}">
+        <p14:creationId xmlns:p14="http://schemas.microsoft.com/office/powerpoint/2010/main" val="1726257277"/>
+      </p:ext>
+    </p:extLst>
+  </p:cSld>
+  <p:clrMapOvr>
+    <a:masterClrMapping/>
+  </p:clrMapOvr>
+</p:notes>
+</file>
+
 <file path=ppt/slideLayouts/slideLayout1.xml><?xml version="1.0" encoding="utf-8"?>
 <p:sldLayout xmlns:a="http://schemas.openxmlformats.org/drawingml/2006/main" xmlns:r="http://schemas.openxmlformats.org/officeDocument/2006/relationships" xmlns:p="http://schemas.openxmlformats.org/presentationml/2006/main" type="title" preserve="1">
   <p:cSld name="Title Slide">
@@ -262,7 +703,7 @@
           <a:p>
             <a:fld id="{11055433-DDDA-1147-A71A-BE0AE55CB161}" type="datetimeFigureOut">
               <a:rPr lang="en-DE" smtClean="0"/>
-              <a:t>21.06.22</a:t>
+              <a:t>11.07.22</a:t>
             </a:fld>
             <a:endParaRPr lang="en-DE"/>
           </a:p>
@@ -462,7 +903,7 @@
           <a:p>
             <a:fld id="{11055433-DDDA-1147-A71A-BE0AE55CB161}" type="datetimeFigureOut">
               <a:rPr lang="en-DE" smtClean="0"/>
-              <a:t>21.06.22</a:t>
+              <a:t>11.07.22</a:t>
             </a:fld>
             <a:endParaRPr lang="en-DE"/>
           </a:p>
@@ -672,7 +1113,7 @@
           <a:p>
             <a:fld id="{11055433-DDDA-1147-A71A-BE0AE55CB161}" type="datetimeFigureOut">
               <a:rPr lang="en-DE" smtClean="0"/>
-              <a:t>21.06.22</a:t>
+              <a:t>11.07.22</a:t>
             </a:fld>
             <a:endParaRPr lang="en-DE"/>
           </a:p>
@@ -978,7 +1419,7 @@
           <a:p>
             <a:fld id="{11055433-DDDA-1147-A71A-BE0AE55CB161}" type="datetimeFigureOut">
               <a:rPr lang="en-DE" smtClean="0"/>
-              <a:t>21.06.22</a:t>
+              <a:t>11.07.22</a:t>
             </a:fld>
             <a:endParaRPr lang="en-DE"/>
           </a:p>
@@ -1246,7 +1687,7 @@
           <a:p>
             <a:fld id="{11055433-DDDA-1147-A71A-BE0AE55CB161}" type="datetimeFigureOut">
               <a:rPr lang="en-DE" smtClean="0"/>
-              <a:t>21.06.22</a:t>
+              <a:t>11.07.22</a:t>
             </a:fld>
             <a:endParaRPr lang="en-DE"/>
           </a:p>
@@ -1661,7 +2102,7 @@
           <a:p>
             <a:fld id="{11055433-DDDA-1147-A71A-BE0AE55CB161}" type="datetimeFigureOut">
               <a:rPr lang="en-DE" smtClean="0"/>
-              <a:t>21.06.22</a:t>
+              <a:t>11.07.22</a:t>
             </a:fld>
             <a:endParaRPr lang="en-DE"/>
           </a:p>
@@ -1803,7 +2244,7 @@
           <a:p>
             <a:fld id="{11055433-DDDA-1147-A71A-BE0AE55CB161}" type="datetimeFigureOut">
               <a:rPr lang="en-DE" smtClean="0"/>
-              <a:t>21.06.22</a:t>
+              <a:t>11.07.22</a:t>
             </a:fld>
             <a:endParaRPr lang="en-DE"/>
           </a:p>
@@ -1916,7 +2357,7 @@
           <a:p>
             <a:fld id="{11055433-DDDA-1147-A71A-BE0AE55CB161}" type="datetimeFigureOut">
               <a:rPr lang="en-DE" smtClean="0"/>
-              <a:t>21.06.22</a:t>
+              <a:t>11.07.22</a:t>
             </a:fld>
             <a:endParaRPr lang="en-DE"/>
           </a:p>
@@ -2229,7 +2670,7 @@
           <a:p>
             <a:fld id="{11055433-DDDA-1147-A71A-BE0AE55CB161}" type="datetimeFigureOut">
               <a:rPr lang="en-DE" smtClean="0"/>
-              <a:t>21.06.22</a:t>
+              <a:t>11.07.22</a:t>
             </a:fld>
             <a:endParaRPr lang="en-DE"/>
           </a:p>
@@ -2518,7 +2959,7 @@
           <a:p>
             <a:fld id="{11055433-DDDA-1147-A71A-BE0AE55CB161}" type="datetimeFigureOut">
               <a:rPr lang="en-DE" smtClean="0"/>
-              <a:t>21.06.22</a:t>
+              <a:t>11.07.22</a:t>
             </a:fld>
             <a:endParaRPr lang="en-DE"/>
           </a:p>
@@ -2761,7 +3202,7 @@
           <a:p>
             <a:fld id="{11055433-DDDA-1147-A71A-BE0AE55CB161}" type="datetimeFigureOut">
               <a:rPr lang="en-DE" smtClean="0"/>
-              <a:t>21.06.22</a:t>
+              <a:t>11.07.22</a:t>
             </a:fld>
             <a:endParaRPr lang="en-DE"/>
           </a:p>
@@ -7376,6 +7817,1124 @@
 </p:sld>
 </file>
 
+<file path=ppt/slides/slide3.xml><?xml version="1.0" encoding="utf-8"?>
+<p:sld xmlns:a="http://schemas.openxmlformats.org/drawingml/2006/main" xmlns:r="http://schemas.openxmlformats.org/officeDocument/2006/relationships" xmlns:p="http://schemas.openxmlformats.org/presentationml/2006/main">
+  <p:cSld>
+    <p:spTree>
+      <p:nvGrpSpPr>
+        <p:cNvPr id="1" name=""/>
+        <p:cNvGrpSpPr/>
+        <p:nvPr/>
+      </p:nvGrpSpPr>
+      <p:grpSpPr>
+        <a:xfrm>
+          <a:off x="0" y="0"/>
+          <a:ext cx="0" cy="0"/>
+          <a:chOff x="0" y="0"/>
+          <a:chExt cx="0" cy="0"/>
+        </a:xfrm>
+      </p:grpSpPr>
+      <p:pic>
+        <p:nvPicPr>
+          <p:cNvPr id="24" name="Picture 23" descr="Diagram&#10;&#10;Description automatically generated">
+            <a:extLst>
+              <a:ext uri="{FF2B5EF4-FFF2-40B4-BE49-F238E27FC236}">
+                <a16:creationId xmlns:a16="http://schemas.microsoft.com/office/drawing/2014/main" id="{CA9D5392-8B1D-73D7-42A9-39373F11DCE5}"/>
+              </a:ext>
+            </a:extLst>
+          </p:cNvPr>
+          <p:cNvPicPr>
+            <a:picLocks noChangeAspect="1"/>
+          </p:cNvPicPr>
+          <p:nvPr/>
+        </p:nvPicPr>
+        <p:blipFill>
+          <a:blip r:embed="rId2"/>
+          <a:stretch>
+            <a:fillRect/>
+          </a:stretch>
+        </p:blipFill>
+        <p:spPr>
+          <a:xfrm>
+            <a:off x="0" y="0"/>
+            <a:ext cx="12192000" cy="6858000"/>
+          </a:xfrm>
+          <a:prstGeom prst="rect">
+            <a:avLst/>
+          </a:prstGeom>
+        </p:spPr>
+      </p:pic>
+    </p:spTree>
+    <p:extLst>
+      <p:ext uri="{BB962C8B-B14F-4D97-AF65-F5344CB8AC3E}">
+        <p14:creationId xmlns:p14="http://schemas.microsoft.com/office/powerpoint/2010/main" val="1290270980"/>
+      </p:ext>
+    </p:extLst>
+  </p:cSld>
+  <p:clrMapOvr>
+    <a:masterClrMapping/>
+  </p:clrMapOvr>
+</p:sld>
+</file>
+
+<file path=ppt/slides/slide4.xml><?xml version="1.0" encoding="utf-8"?>
+<p:sld xmlns:a="http://schemas.openxmlformats.org/drawingml/2006/main" xmlns:r="http://schemas.openxmlformats.org/officeDocument/2006/relationships" xmlns:p="http://schemas.openxmlformats.org/presentationml/2006/main">
+  <p:cSld>
+    <p:spTree>
+      <p:nvGrpSpPr>
+        <p:cNvPr id="1" name=""/>
+        <p:cNvGrpSpPr/>
+        <p:nvPr/>
+      </p:nvGrpSpPr>
+      <p:grpSpPr>
+        <a:xfrm>
+          <a:off x="0" y="0"/>
+          <a:ext cx="0" cy="0"/>
+          <a:chOff x="0" y="0"/>
+          <a:chExt cx="0" cy="0"/>
+        </a:xfrm>
+      </p:grpSpPr>
+      <p:pic>
+        <p:nvPicPr>
+          <p:cNvPr id="24" name="Picture 23" descr="Graphical user interface, diagram&#10;&#10;Description automatically generated">
+            <a:extLst>
+              <a:ext uri="{FF2B5EF4-FFF2-40B4-BE49-F238E27FC236}">
+                <a16:creationId xmlns:a16="http://schemas.microsoft.com/office/drawing/2014/main" id="{21203C6D-239C-327A-CF72-764AE496A273}"/>
+              </a:ext>
+            </a:extLst>
+          </p:cNvPr>
+          <p:cNvPicPr>
+            <a:picLocks noChangeAspect="1"/>
+          </p:cNvPicPr>
+          <p:nvPr/>
+        </p:nvPicPr>
+        <p:blipFill>
+          <a:blip r:embed="rId2"/>
+          <a:stretch>
+            <a:fillRect/>
+          </a:stretch>
+        </p:blipFill>
+        <p:spPr>
+          <a:xfrm>
+            <a:off x="0" y="0"/>
+            <a:ext cx="12192000" cy="6858000"/>
+          </a:xfrm>
+          <a:prstGeom prst="rect">
+            <a:avLst/>
+          </a:prstGeom>
+        </p:spPr>
+      </p:pic>
+    </p:spTree>
+    <p:extLst>
+      <p:ext uri="{BB962C8B-B14F-4D97-AF65-F5344CB8AC3E}">
+        <p14:creationId xmlns:p14="http://schemas.microsoft.com/office/powerpoint/2010/main" val="3511506138"/>
+      </p:ext>
+    </p:extLst>
+  </p:cSld>
+  <p:clrMapOvr>
+    <a:masterClrMapping/>
+  </p:clrMapOvr>
+</p:sld>
+</file>
+
+<file path=ppt/slides/slide5.xml><?xml version="1.0" encoding="utf-8"?>
+<p:sld xmlns:a="http://schemas.openxmlformats.org/drawingml/2006/main" xmlns:r="http://schemas.openxmlformats.org/officeDocument/2006/relationships" xmlns:p="http://schemas.openxmlformats.org/presentationml/2006/main">
+  <p:cSld>
+    <p:spTree>
+      <p:nvGrpSpPr>
+        <p:cNvPr id="1" name=""/>
+        <p:cNvGrpSpPr/>
+        <p:nvPr/>
+      </p:nvGrpSpPr>
+      <p:grpSpPr>
+        <a:xfrm>
+          <a:off x="0" y="0"/>
+          <a:ext cx="0" cy="0"/>
+          <a:chOff x="0" y="0"/>
+          <a:chExt cx="0" cy="0"/>
+        </a:xfrm>
+      </p:grpSpPr>
+      <p:pic>
+        <p:nvPicPr>
+          <p:cNvPr id="24" name="Picture 23" descr="Diagram&#10;&#10;Description automatically generated">
+            <a:extLst>
+              <a:ext uri="{FF2B5EF4-FFF2-40B4-BE49-F238E27FC236}">
+                <a16:creationId xmlns:a16="http://schemas.microsoft.com/office/drawing/2014/main" id="{CA9D5392-8B1D-73D7-42A9-39373F11DCE5}"/>
+              </a:ext>
+            </a:extLst>
+          </p:cNvPr>
+          <p:cNvPicPr>
+            <a:picLocks noChangeAspect="1"/>
+          </p:cNvPicPr>
+          <p:nvPr/>
+        </p:nvPicPr>
+        <p:blipFill>
+          <a:blip r:embed="rId2"/>
+          <a:stretch>
+            <a:fillRect/>
+          </a:stretch>
+        </p:blipFill>
+        <p:spPr>
+          <a:xfrm>
+            <a:off x="0" y="0"/>
+            <a:ext cx="12192000" cy="6858000"/>
+          </a:xfrm>
+          <a:prstGeom prst="rect">
+            <a:avLst/>
+          </a:prstGeom>
+        </p:spPr>
+      </p:pic>
+      <p:sp>
+        <p:nvSpPr>
+          <p:cNvPr id="3" name="Rectangle 2">
+            <a:extLst>
+              <a:ext uri="{FF2B5EF4-FFF2-40B4-BE49-F238E27FC236}">
+                <a16:creationId xmlns:a16="http://schemas.microsoft.com/office/drawing/2014/main" id="{09A5C2C1-2C1A-0C71-F5BA-41E716A1ADC8}"/>
+              </a:ext>
+            </a:extLst>
+          </p:cNvPr>
+          <p:cNvSpPr/>
+          <p:nvPr/>
+        </p:nvSpPr>
+        <p:spPr>
+          <a:xfrm>
+            <a:off x="4015564" y="5681330"/>
+            <a:ext cx="1853610" cy="910856"/>
+          </a:xfrm>
+          <a:prstGeom prst="rect">
+            <a:avLst/>
+          </a:prstGeom>
+          <a:solidFill>
+            <a:schemeClr val="bg1"/>
+          </a:solidFill>
+          <a:ln w="28575">
+            <a:solidFill>
+              <a:srgbClr val="1A9898"/>
+            </a:solidFill>
+          </a:ln>
+        </p:spPr>
+        <p:style>
+          <a:lnRef idx="2">
+            <a:schemeClr val="accent1">
+              <a:shade val="50000"/>
+            </a:schemeClr>
+          </a:lnRef>
+          <a:fillRef idx="1">
+            <a:schemeClr val="accent1"/>
+          </a:fillRef>
+          <a:effectRef idx="0">
+            <a:schemeClr val="accent1"/>
+          </a:effectRef>
+          <a:fontRef idx="minor">
+            <a:schemeClr val="lt1"/>
+          </a:fontRef>
+        </p:style>
+        <p:txBody>
+          <a:bodyPr rtlCol="0" anchor="ctr"/>
+          <a:lstStyle/>
+          <a:p>
+            <a:pPr algn="ctr"/>
+            <a:r>
+              <a:rPr lang="en-DE" sz="1200" dirty="0">
+                <a:solidFill>
+                  <a:schemeClr val="tx1"/>
+                </a:solidFill>
+              </a:rPr>
+              <a:t>Corporate identity Provider</a:t>
+            </a:r>
+          </a:p>
+          <a:p>
+            <a:pPr algn="ctr"/>
+            <a:r>
+              <a:rPr lang="en-DE" sz="800" dirty="0">
+                <a:solidFill>
+                  <a:schemeClr val="tx1"/>
+                </a:solidFill>
+              </a:rPr>
+              <a:t>(Microsoft Azure Active Directory)</a:t>
+            </a:r>
+          </a:p>
+        </p:txBody>
+      </p:sp>
+      <p:sp>
+        <p:nvSpPr>
+          <p:cNvPr id="4" name="Rectangle 3">
+            <a:extLst>
+              <a:ext uri="{FF2B5EF4-FFF2-40B4-BE49-F238E27FC236}">
+                <a16:creationId xmlns:a16="http://schemas.microsoft.com/office/drawing/2014/main" id="{B2C431C3-2BA4-BB3B-F3D4-DD29DFE94ADD}"/>
+              </a:ext>
+            </a:extLst>
+          </p:cNvPr>
+          <p:cNvSpPr/>
+          <p:nvPr/>
+        </p:nvSpPr>
+        <p:spPr>
+          <a:xfrm>
+            <a:off x="3863164" y="5528930"/>
+            <a:ext cx="1853610" cy="910856"/>
+          </a:xfrm>
+          <a:prstGeom prst="rect">
+            <a:avLst/>
+          </a:prstGeom>
+          <a:solidFill>
+            <a:schemeClr val="bg1"/>
+          </a:solidFill>
+          <a:ln w="28575">
+            <a:solidFill>
+              <a:srgbClr val="1A9898"/>
+            </a:solidFill>
+          </a:ln>
+        </p:spPr>
+        <p:style>
+          <a:lnRef idx="2">
+            <a:schemeClr val="accent1">
+              <a:shade val="50000"/>
+            </a:schemeClr>
+          </a:lnRef>
+          <a:fillRef idx="1">
+            <a:schemeClr val="accent1"/>
+          </a:fillRef>
+          <a:effectRef idx="0">
+            <a:schemeClr val="accent1"/>
+          </a:effectRef>
+          <a:fontRef idx="minor">
+            <a:schemeClr val="lt1"/>
+          </a:fontRef>
+        </p:style>
+        <p:txBody>
+          <a:bodyPr rtlCol="0" anchor="ctr"/>
+          <a:lstStyle/>
+          <a:p>
+            <a:pPr algn="ctr"/>
+            <a:r>
+              <a:rPr lang="en-DE" sz="1200" dirty="0">
+                <a:solidFill>
+                  <a:schemeClr val="tx1"/>
+                </a:solidFill>
+              </a:rPr>
+              <a:t>Corporate identity Provider</a:t>
+            </a:r>
+          </a:p>
+          <a:p>
+            <a:pPr algn="ctr"/>
+            <a:r>
+              <a:rPr lang="en-DE" sz="800" dirty="0">
+                <a:solidFill>
+                  <a:schemeClr val="tx1"/>
+                </a:solidFill>
+              </a:rPr>
+              <a:t>(Microsoft Azure Active Directory)</a:t>
+            </a:r>
+          </a:p>
+        </p:txBody>
+      </p:sp>
+      <p:sp>
+        <p:nvSpPr>
+          <p:cNvPr id="5" name="Rectangle 4">
+            <a:extLst>
+              <a:ext uri="{FF2B5EF4-FFF2-40B4-BE49-F238E27FC236}">
+                <a16:creationId xmlns:a16="http://schemas.microsoft.com/office/drawing/2014/main" id="{6C544B01-2B3D-B378-0943-67540FFC7671}"/>
+              </a:ext>
+            </a:extLst>
+          </p:cNvPr>
+          <p:cNvSpPr/>
+          <p:nvPr/>
+        </p:nvSpPr>
+        <p:spPr>
+          <a:xfrm>
+            <a:off x="3710764" y="5376530"/>
+            <a:ext cx="1853610" cy="910856"/>
+          </a:xfrm>
+          <a:prstGeom prst="rect">
+            <a:avLst/>
+          </a:prstGeom>
+          <a:solidFill>
+            <a:schemeClr val="bg1"/>
+          </a:solidFill>
+          <a:ln w="28575">
+            <a:solidFill>
+              <a:srgbClr val="1A9898"/>
+            </a:solidFill>
+          </a:ln>
+        </p:spPr>
+        <p:style>
+          <a:lnRef idx="2">
+            <a:schemeClr val="accent1">
+              <a:shade val="50000"/>
+            </a:schemeClr>
+          </a:lnRef>
+          <a:fillRef idx="1">
+            <a:schemeClr val="accent1"/>
+          </a:fillRef>
+          <a:effectRef idx="0">
+            <a:schemeClr val="accent1"/>
+          </a:effectRef>
+          <a:fontRef idx="minor">
+            <a:schemeClr val="lt1"/>
+          </a:fontRef>
+        </p:style>
+        <p:txBody>
+          <a:bodyPr rtlCol="0" anchor="ctr"/>
+          <a:lstStyle/>
+          <a:p>
+            <a:pPr algn="ctr"/>
+            <a:r>
+              <a:rPr lang="en-DE" sz="1200" dirty="0">
+                <a:solidFill>
+                  <a:schemeClr val="tx1"/>
+                </a:solidFill>
+              </a:rPr>
+              <a:t>Corporate identity Provider</a:t>
+            </a:r>
+          </a:p>
+          <a:p>
+            <a:pPr algn="ctr"/>
+            <a:r>
+              <a:rPr lang="en-DE" sz="800" dirty="0">
+                <a:solidFill>
+                  <a:schemeClr val="tx1"/>
+                </a:solidFill>
+              </a:rPr>
+              <a:t>(Microsoft Azure Active Directory)</a:t>
+            </a:r>
+          </a:p>
+        </p:txBody>
+      </p:sp>
+      <p:cxnSp>
+        <p:nvCxnSpPr>
+          <p:cNvPr id="6" name="Straight Arrow Connector 5">
+            <a:extLst>
+              <a:ext uri="{FF2B5EF4-FFF2-40B4-BE49-F238E27FC236}">
+                <a16:creationId xmlns:a16="http://schemas.microsoft.com/office/drawing/2014/main" id="{8C20324A-A2F5-310C-C2D1-40E2D3308039}"/>
+              </a:ext>
+            </a:extLst>
+          </p:cNvPr>
+          <p:cNvCxnSpPr/>
+          <p:nvPr/>
+        </p:nvCxnSpPr>
+        <p:spPr>
+          <a:xfrm flipH="1">
+            <a:off x="5564374" y="6081823"/>
+            <a:ext cx="1681714" cy="0"/>
+          </a:xfrm>
+          <a:prstGeom prst="straightConnector1">
+            <a:avLst/>
+          </a:prstGeom>
+          <a:ln w="22225">
+            <a:solidFill>
+              <a:srgbClr val="BF39A0"/>
+            </a:solidFill>
+            <a:headEnd type="triangle"/>
+            <a:tailEnd type="triangle"/>
+          </a:ln>
+        </p:spPr>
+        <p:style>
+          <a:lnRef idx="1">
+            <a:schemeClr val="accent1"/>
+          </a:lnRef>
+          <a:fillRef idx="0">
+            <a:schemeClr val="accent1"/>
+          </a:fillRef>
+          <a:effectRef idx="0">
+            <a:schemeClr val="accent1"/>
+          </a:effectRef>
+          <a:fontRef idx="minor">
+            <a:schemeClr val="tx1"/>
+          </a:fontRef>
+        </p:style>
+      </p:cxnSp>
+      <p:sp>
+        <p:nvSpPr>
+          <p:cNvPr id="7" name="Rounded Rectangle 6">
+            <a:extLst>
+              <a:ext uri="{FF2B5EF4-FFF2-40B4-BE49-F238E27FC236}">
+                <a16:creationId xmlns:a16="http://schemas.microsoft.com/office/drawing/2014/main" id="{48A34220-DE2B-FCC5-680A-14064BB59E03}"/>
+              </a:ext>
+            </a:extLst>
+          </p:cNvPr>
+          <p:cNvSpPr/>
+          <p:nvPr/>
+        </p:nvSpPr>
+        <p:spPr>
+          <a:xfrm>
+            <a:off x="6021574" y="5984358"/>
+            <a:ext cx="818707" cy="202018"/>
+          </a:xfrm>
+          <a:prstGeom prst="roundRect">
+            <a:avLst>
+              <a:gd name="adj" fmla="val 50000"/>
+            </a:avLst>
+          </a:prstGeom>
+          <a:solidFill>
+            <a:srgbClr val="BF39A0"/>
+          </a:solidFill>
+          <a:ln>
+            <a:noFill/>
+          </a:ln>
+          <a:effectLst>
+            <a:softEdge rad="0"/>
+          </a:effectLst>
+        </p:spPr>
+        <p:style>
+          <a:lnRef idx="2">
+            <a:schemeClr val="accent1">
+              <a:shade val="50000"/>
+            </a:schemeClr>
+          </a:lnRef>
+          <a:fillRef idx="1">
+            <a:schemeClr val="accent1"/>
+          </a:fillRef>
+          <a:effectRef idx="0">
+            <a:schemeClr val="accent1"/>
+          </a:effectRef>
+          <a:fontRef idx="minor">
+            <a:schemeClr val="lt1"/>
+          </a:fontRef>
+        </p:style>
+        <p:txBody>
+          <a:bodyPr rtlCol="0" anchor="ctr"/>
+          <a:lstStyle/>
+          <a:p>
+            <a:pPr algn="ctr"/>
+            <a:r>
+              <a:rPr lang="en-DE" sz="1100" dirty="0"/>
+              <a:t>Trust</a:t>
+            </a:r>
+          </a:p>
+        </p:txBody>
+      </p:sp>
+      <p:sp>
+        <p:nvSpPr>
+          <p:cNvPr id="8" name="Rounded Rectangle 7">
+            <a:extLst>
+              <a:ext uri="{FF2B5EF4-FFF2-40B4-BE49-F238E27FC236}">
+                <a16:creationId xmlns:a16="http://schemas.microsoft.com/office/drawing/2014/main" id="{B6418F91-E3BF-D999-4144-2A59F625AE26}"/>
+              </a:ext>
+            </a:extLst>
+          </p:cNvPr>
+          <p:cNvSpPr/>
+          <p:nvPr/>
+        </p:nvSpPr>
+        <p:spPr>
+          <a:xfrm>
+            <a:off x="6189922" y="5089452"/>
+            <a:ext cx="1146543" cy="202018"/>
+          </a:xfrm>
+          <a:prstGeom prst="roundRect">
+            <a:avLst>
+              <a:gd name="adj" fmla="val 50000"/>
+            </a:avLst>
+          </a:prstGeom>
+          <a:solidFill>
+            <a:srgbClr val="BF39A0"/>
+          </a:solidFill>
+          <a:ln>
+            <a:noFill/>
+          </a:ln>
+          <a:effectLst>
+            <a:softEdge rad="0"/>
+          </a:effectLst>
+        </p:spPr>
+        <p:style>
+          <a:lnRef idx="2">
+            <a:schemeClr val="accent1">
+              <a:shade val="50000"/>
+            </a:schemeClr>
+          </a:lnRef>
+          <a:fillRef idx="1">
+            <a:schemeClr val="accent1"/>
+          </a:fillRef>
+          <a:effectRef idx="0">
+            <a:schemeClr val="accent1"/>
+          </a:effectRef>
+          <a:fontRef idx="minor">
+            <a:schemeClr val="lt1"/>
+          </a:fontRef>
+        </p:style>
+        <p:txBody>
+          <a:bodyPr rtlCol="0" anchor="ctr"/>
+          <a:lstStyle/>
+          <a:p>
+            <a:pPr algn="ctr"/>
+            <a:r>
+              <a:rPr lang="en-DE" sz="1100" dirty="0"/>
+              <a:t>Trust</a:t>
+            </a:r>
+          </a:p>
+        </p:txBody>
+      </p:sp>
+      <p:sp>
+        <p:nvSpPr>
+          <p:cNvPr id="9" name="Rounded Rectangle 8">
+            <a:extLst>
+              <a:ext uri="{FF2B5EF4-FFF2-40B4-BE49-F238E27FC236}">
+                <a16:creationId xmlns:a16="http://schemas.microsoft.com/office/drawing/2014/main" id="{EC57520A-1EF4-C53D-74D6-C1169C5D1C4B}"/>
+              </a:ext>
+            </a:extLst>
+          </p:cNvPr>
+          <p:cNvSpPr/>
+          <p:nvPr/>
+        </p:nvSpPr>
+        <p:spPr>
+          <a:xfrm>
+            <a:off x="9441714" y="5089452"/>
+            <a:ext cx="1146543" cy="202018"/>
+          </a:xfrm>
+          <a:prstGeom prst="roundRect">
+            <a:avLst>
+              <a:gd name="adj" fmla="val 50000"/>
+            </a:avLst>
+          </a:prstGeom>
+          <a:solidFill>
+            <a:srgbClr val="BF39A0"/>
+          </a:solidFill>
+          <a:ln>
+            <a:noFill/>
+          </a:ln>
+          <a:effectLst>
+            <a:softEdge rad="0"/>
+          </a:effectLst>
+        </p:spPr>
+        <p:style>
+          <a:lnRef idx="2">
+            <a:schemeClr val="accent1">
+              <a:shade val="50000"/>
+            </a:schemeClr>
+          </a:lnRef>
+          <a:fillRef idx="1">
+            <a:schemeClr val="accent1"/>
+          </a:fillRef>
+          <a:effectRef idx="0">
+            <a:schemeClr val="accent1"/>
+          </a:effectRef>
+          <a:fontRef idx="minor">
+            <a:schemeClr val="lt1"/>
+          </a:fontRef>
+        </p:style>
+        <p:txBody>
+          <a:bodyPr rtlCol="0" anchor="ctr"/>
+          <a:lstStyle/>
+          <a:p>
+            <a:pPr algn="ctr"/>
+            <a:r>
+              <a:rPr lang="en-DE" sz="1100" dirty="0"/>
+              <a:t>Trust</a:t>
+            </a:r>
+          </a:p>
+        </p:txBody>
+      </p:sp>
+    </p:spTree>
+    <p:extLst>
+      <p:ext uri="{BB962C8B-B14F-4D97-AF65-F5344CB8AC3E}">
+        <p14:creationId xmlns:p14="http://schemas.microsoft.com/office/powerpoint/2010/main" val="4101910016"/>
+      </p:ext>
+    </p:extLst>
+  </p:cSld>
+  <p:clrMapOvr>
+    <a:masterClrMapping/>
+  </p:clrMapOvr>
+</p:sld>
+</file>
+
+<file path=ppt/slides/slide6.xml><?xml version="1.0" encoding="utf-8"?>
+<p:sld xmlns:a="http://schemas.openxmlformats.org/drawingml/2006/main" xmlns:r="http://schemas.openxmlformats.org/officeDocument/2006/relationships" xmlns:p="http://schemas.openxmlformats.org/presentationml/2006/main">
+  <p:cSld>
+    <p:spTree>
+      <p:nvGrpSpPr>
+        <p:cNvPr id="1" name=""/>
+        <p:cNvGrpSpPr/>
+        <p:nvPr/>
+      </p:nvGrpSpPr>
+      <p:grpSpPr>
+        <a:xfrm>
+          <a:off x="0" y="0"/>
+          <a:ext cx="0" cy="0"/>
+          <a:chOff x="0" y="0"/>
+          <a:chExt cx="0" cy="0"/>
+        </a:xfrm>
+      </p:grpSpPr>
+      <p:pic>
+        <p:nvPicPr>
+          <p:cNvPr id="24" name="Picture 23" descr="Graphical user interface, diagram&#10;&#10;Description automatically generated">
+            <a:extLst>
+              <a:ext uri="{FF2B5EF4-FFF2-40B4-BE49-F238E27FC236}">
+                <a16:creationId xmlns:a16="http://schemas.microsoft.com/office/drawing/2014/main" id="{21203C6D-239C-327A-CF72-764AE496A273}"/>
+              </a:ext>
+            </a:extLst>
+          </p:cNvPr>
+          <p:cNvPicPr>
+            <a:picLocks noChangeAspect="1"/>
+          </p:cNvPicPr>
+          <p:nvPr/>
+        </p:nvPicPr>
+        <p:blipFill>
+          <a:blip r:embed="rId3"/>
+          <a:stretch>
+            <a:fillRect/>
+          </a:stretch>
+        </p:blipFill>
+        <p:spPr>
+          <a:xfrm>
+            <a:off x="0" y="4"/>
+            <a:ext cx="12192000" cy="6858000"/>
+          </a:xfrm>
+          <a:prstGeom prst="rect">
+            <a:avLst/>
+          </a:prstGeom>
+        </p:spPr>
+      </p:pic>
+      <p:sp>
+        <p:nvSpPr>
+          <p:cNvPr id="5" name="Rectangle 4">
+            <a:extLst>
+              <a:ext uri="{FF2B5EF4-FFF2-40B4-BE49-F238E27FC236}">
+                <a16:creationId xmlns:a16="http://schemas.microsoft.com/office/drawing/2014/main" id="{DBBA9B2C-9159-C42F-C298-C2C8E51F9DA7}"/>
+              </a:ext>
+            </a:extLst>
+          </p:cNvPr>
+          <p:cNvSpPr/>
+          <p:nvPr/>
+        </p:nvSpPr>
+        <p:spPr>
+          <a:xfrm>
+            <a:off x="4015564" y="5660070"/>
+            <a:ext cx="1853610" cy="910856"/>
+          </a:xfrm>
+          <a:prstGeom prst="rect">
+            <a:avLst/>
+          </a:prstGeom>
+          <a:solidFill>
+            <a:schemeClr val="bg1"/>
+          </a:solidFill>
+          <a:ln w="28575">
+            <a:solidFill>
+              <a:srgbClr val="1A9898"/>
+            </a:solidFill>
+          </a:ln>
+        </p:spPr>
+        <p:style>
+          <a:lnRef idx="2">
+            <a:schemeClr val="accent1">
+              <a:shade val="50000"/>
+            </a:schemeClr>
+          </a:lnRef>
+          <a:fillRef idx="1">
+            <a:schemeClr val="accent1"/>
+          </a:fillRef>
+          <a:effectRef idx="0">
+            <a:schemeClr val="accent1"/>
+          </a:effectRef>
+          <a:fontRef idx="minor">
+            <a:schemeClr val="lt1"/>
+          </a:fontRef>
+        </p:style>
+        <p:txBody>
+          <a:bodyPr rtlCol="0" anchor="ctr"/>
+          <a:lstStyle/>
+          <a:p>
+            <a:pPr algn="ctr"/>
+            <a:r>
+              <a:rPr lang="en-DE" sz="1200" dirty="0">
+                <a:solidFill>
+                  <a:schemeClr val="tx1"/>
+                </a:solidFill>
+              </a:rPr>
+              <a:t>Corporate identity Provider</a:t>
+            </a:r>
+          </a:p>
+          <a:p>
+            <a:pPr algn="ctr"/>
+            <a:r>
+              <a:rPr lang="en-DE" sz="800" dirty="0">
+                <a:solidFill>
+                  <a:schemeClr val="tx1"/>
+                </a:solidFill>
+              </a:rPr>
+              <a:t>(Microsoft Azure Active Directory)</a:t>
+            </a:r>
+          </a:p>
+        </p:txBody>
+      </p:sp>
+      <p:sp>
+        <p:nvSpPr>
+          <p:cNvPr id="4" name="Rectangle 3">
+            <a:extLst>
+              <a:ext uri="{FF2B5EF4-FFF2-40B4-BE49-F238E27FC236}">
+                <a16:creationId xmlns:a16="http://schemas.microsoft.com/office/drawing/2014/main" id="{E809AC89-1A45-13EE-1A16-7AE4B34DF273}"/>
+              </a:ext>
+            </a:extLst>
+          </p:cNvPr>
+          <p:cNvSpPr/>
+          <p:nvPr/>
+        </p:nvSpPr>
+        <p:spPr>
+          <a:xfrm>
+            <a:off x="3863164" y="5507670"/>
+            <a:ext cx="1853610" cy="910856"/>
+          </a:xfrm>
+          <a:prstGeom prst="rect">
+            <a:avLst/>
+          </a:prstGeom>
+          <a:solidFill>
+            <a:schemeClr val="bg1"/>
+          </a:solidFill>
+          <a:ln w="28575">
+            <a:solidFill>
+              <a:srgbClr val="1A9898"/>
+            </a:solidFill>
+          </a:ln>
+        </p:spPr>
+        <p:style>
+          <a:lnRef idx="2">
+            <a:schemeClr val="accent1">
+              <a:shade val="50000"/>
+            </a:schemeClr>
+          </a:lnRef>
+          <a:fillRef idx="1">
+            <a:schemeClr val="accent1"/>
+          </a:fillRef>
+          <a:effectRef idx="0">
+            <a:schemeClr val="accent1"/>
+          </a:effectRef>
+          <a:fontRef idx="minor">
+            <a:schemeClr val="lt1"/>
+          </a:fontRef>
+        </p:style>
+        <p:txBody>
+          <a:bodyPr rtlCol="0" anchor="ctr"/>
+          <a:lstStyle/>
+          <a:p>
+            <a:pPr algn="ctr"/>
+            <a:r>
+              <a:rPr lang="en-DE" sz="1200" dirty="0">
+                <a:solidFill>
+                  <a:schemeClr val="tx1"/>
+                </a:solidFill>
+              </a:rPr>
+              <a:t>Corporate identity Provider</a:t>
+            </a:r>
+          </a:p>
+          <a:p>
+            <a:pPr algn="ctr"/>
+            <a:r>
+              <a:rPr lang="en-DE" sz="800" dirty="0">
+                <a:solidFill>
+                  <a:schemeClr val="tx1"/>
+                </a:solidFill>
+              </a:rPr>
+              <a:t>(Microsoft Azure Active Directory)</a:t>
+            </a:r>
+          </a:p>
+        </p:txBody>
+      </p:sp>
+      <p:sp>
+        <p:nvSpPr>
+          <p:cNvPr id="2" name="Rectangle 1">
+            <a:extLst>
+              <a:ext uri="{FF2B5EF4-FFF2-40B4-BE49-F238E27FC236}">
+                <a16:creationId xmlns:a16="http://schemas.microsoft.com/office/drawing/2014/main" id="{88DF3738-0F7B-6E68-BE7A-D1E452DDEC86}"/>
+              </a:ext>
+            </a:extLst>
+          </p:cNvPr>
+          <p:cNvSpPr/>
+          <p:nvPr/>
+        </p:nvSpPr>
+        <p:spPr>
+          <a:xfrm>
+            <a:off x="3710764" y="5355270"/>
+            <a:ext cx="1853610" cy="910856"/>
+          </a:xfrm>
+          <a:prstGeom prst="rect">
+            <a:avLst/>
+          </a:prstGeom>
+          <a:solidFill>
+            <a:schemeClr val="bg1"/>
+          </a:solidFill>
+          <a:ln w="28575">
+            <a:solidFill>
+              <a:srgbClr val="1A9898"/>
+            </a:solidFill>
+          </a:ln>
+        </p:spPr>
+        <p:style>
+          <a:lnRef idx="2">
+            <a:schemeClr val="accent1">
+              <a:shade val="50000"/>
+            </a:schemeClr>
+          </a:lnRef>
+          <a:fillRef idx="1">
+            <a:schemeClr val="accent1"/>
+          </a:fillRef>
+          <a:effectRef idx="0">
+            <a:schemeClr val="accent1"/>
+          </a:effectRef>
+          <a:fontRef idx="minor">
+            <a:schemeClr val="lt1"/>
+          </a:fontRef>
+        </p:style>
+        <p:txBody>
+          <a:bodyPr rtlCol="0" anchor="ctr"/>
+          <a:lstStyle/>
+          <a:p>
+            <a:pPr algn="ctr"/>
+            <a:r>
+              <a:rPr lang="en-DE" sz="1200" dirty="0">
+                <a:solidFill>
+                  <a:schemeClr val="tx1"/>
+                </a:solidFill>
+              </a:rPr>
+              <a:t>Corporate identity Provider</a:t>
+            </a:r>
+          </a:p>
+          <a:p>
+            <a:pPr algn="ctr"/>
+            <a:r>
+              <a:rPr lang="en-DE" sz="800" dirty="0">
+                <a:solidFill>
+                  <a:schemeClr val="tx1"/>
+                </a:solidFill>
+              </a:rPr>
+              <a:t>(Microsoft Azure Active Directory)</a:t>
+            </a:r>
+          </a:p>
+        </p:txBody>
+      </p:sp>
+      <p:cxnSp>
+        <p:nvCxnSpPr>
+          <p:cNvPr id="6" name="Straight Arrow Connector 5">
+            <a:extLst>
+              <a:ext uri="{FF2B5EF4-FFF2-40B4-BE49-F238E27FC236}">
+                <a16:creationId xmlns:a16="http://schemas.microsoft.com/office/drawing/2014/main" id="{482E55C9-BF67-EBB9-D44B-DD1474B14EA4}"/>
+              </a:ext>
+            </a:extLst>
+          </p:cNvPr>
+          <p:cNvCxnSpPr/>
+          <p:nvPr/>
+        </p:nvCxnSpPr>
+        <p:spPr>
+          <a:xfrm flipH="1">
+            <a:off x="5564374" y="6060563"/>
+            <a:ext cx="1681714" cy="0"/>
+          </a:xfrm>
+          <a:prstGeom prst="straightConnector1">
+            <a:avLst/>
+          </a:prstGeom>
+          <a:ln w="22225">
+            <a:solidFill>
+              <a:srgbClr val="BF39A0"/>
+            </a:solidFill>
+            <a:headEnd type="triangle"/>
+            <a:tailEnd type="triangle"/>
+          </a:ln>
+        </p:spPr>
+        <p:style>
+          <a:lnRef idx="1">
+            <a:schemeClr val="accent1"/>
+          </a:lnRef>
+          <a:fillRef idx="0">
+            <a:schemeClr val="accent1"/>
+          </a:fillRef>
+          <a:effectRef idx="0">
+            <a:schemeClr val="accent1"/>
+          </a:effectRef>
+          <a:fontRef idx="minor">
+            <a:schemeClr val="tx1"/>
+          </a:fontRef>
+        </p:style>
+      </p:cxnSp>
+      <p:sp>
+        <p:nvSpPr>
+          <p:cNvPr id="7" name="Rounded Rectangle 6">
+            <a:extLst>
+              <a:ext uri="{FF2B5EF4-FFF2-40B4-BE49-F238E27FC236}">
+                <a16:creationId xmlns:a16="http://schemas.microsoft.com/office/drawing/2014/main" id="{4966E920-3EFF-0F64-AE2F-24A0C5AADD3D}"/>
+              </a:ext>
+            </a:extLst>
+          </p:cNvPr>
+          <p:cNvSpPr/>
+          <p:nvPr/>
+        </p:nvSpPr>
+        <p:spPr>
+          <a:xfrm>
+            <a:off x="6021574" y="5963098"/>
+            <a:ext cx="818707" cy="202018"/>
+          </a:xfrm>
+          <a:prstGeom prst="roundRect">
+            <a:avLst>
+              <a:gd name="adj" fmla="val 50000"/>
+            </a:avLst>
+          </a:prstGeom>
+          <a:solidFill>
+            <a:srgbClr val="BF39A0"/>
+          </a:solidFill>
+          <a:ln>
+            <a:noFill/>
+          </a:ln>
+          <a:effectLst>
+            <a:softEdge rad="0"/>
+          </a:effectLst>
+        </p:spPr>
+        <p:style>
+          <a:lnRef idx="2">
+            <a:schemeClr val="accent1">
+              <a:shade val="50000"/>
+            </a:schemeClr>
+          </a:lnRef>
+          <a:fillRef idx="1">
+            <a:schemeClr val="accent1"/>
+          </a:fillRef>
+          <a:effectRef idx="0">
+            <a:schemeClr val="accent1"/>
+          </a:effectRef>
+          <a:fontRef idx="minor">
+            <a:schemeClr val="lt1"/>
+          </a:fontRef>
+        </p:style>
+        <p:txBody>
+          <a:bodyPr rtlCol="0" anchor="ctr"/>
+          <a:lstStyle/>
+          <a:p>
+            <a:pPr algn="ctr"/>
+            <a:r>
+              <a:rPr lang="en-DE" sz="1100" dirty="0"/>
+              <a:t>Trust</a:t>
+            </a:r>
+          </a:p>
+        </p:txBody>
+      </p:sp>
+      <p:sp>
+        <p:nvSpPr>
+          <p:cNvPr id="9" name="Rounded Rectangle 8">
+            <a:extLst>
+              <a:ext uri="{FF2B5EF4-FFF2-40B4-BE49-F238E27FC236}">
+                <a16:creationId xmlns:a16="http://schemas.microsoft.com/office/drawing/2014/main" id="{2E639E79-1FA2-258E-4849-68AC5CAF48E4}"/>
+              </a:ext>
+            </a:extLst>
+          </p:cNvPr>
+          <p:cNvSpPr/>
+          <p:nvPr/>
+        </p:nvSpPr>
+        <p:spPr>
+          <a:xfrm>
+            <a:off x="6189922" y="5068192"/>
+            <a:ext cx="1146543" cy="202018"/>
+          </a:xfrm>
+          <a:prstGeom prst="roundRect">
+            <a:avLst>
+              <a:gd name="adj" fmla="val 50000"/>
+            </a:avLst>
+          </a:prstGeom>
+          <a:solidFill>
+            <a:srgbClr val="BF39A0"/>
+          </a:solidFill>
+          <a:ln>
+            <a:noFill/>
+          </a:ln>
+          <a:effectLst>
+            <a:softEdge rad="0"/>
+          </a:effectLst>
+        </p:spPr>
+        <p:style>
+          <a:lnRef idx="2">
+            <a:schemeClr val="accent1">
+              <a:shade val="50000"/>
+            </a:schemeClr>
+          </a:lnRef>
+          <a:fillRef idx="1">
+            <a:schemeClr val="accent1"/>
+          </a:fillRef>
+          <a:effectRef idx="0">
+            <a:schemeClr val="accent1"/>
+          </a:effectRef>
+          <a:fontRef idx="minor">
+            <a:schemeClr val="lt1"/>
+          </a:fontRef>
+        </p:style>
+        <p:txBody>
+          <a:bodyPr rtlCol="0" anchor="ctr"/>
+          <a:lstStyle/>
+          <a:p>
+            <a:pPr algn="ctr"/>
+            <a:r>
+              <a:rPr lang="en-DE" sz="1100" dirty="0"/>
+              <a:t>Trust</a:t>
+            </a:r>
+          </a:p>
+        </p:txBody>
+      </p:sp>
+      <p:sp>
+        <p:nvSpPr>
+          <p:cNvPr id="10" name="Rounded Rectangle 9">
+            <a:extLst>
+              <a:ext uri="{FF2B5EF4-FFF2-40B4-BE49-F238E27FC236}">
+                <a16:creationId xmlns:a16="http://schemas.microsoft.com/office/drawing/2014/main" id="{1BA6CB60-E4EA-490C-B62E-BC0A1C0B4DF1}"/>
+              </a:ext>
+            </a:extLst>
+          </p:cNvPr>
+          <p:cNvSpPr/>
+          <p:nvPr/>
+        </p:nvSpPr>
+        <p:spPr>
+          <a:xfrm>
+            <a:off x="9441714" y="5068192"/>
+            <a:ext cx="1146543" cy="202018"/>
+          </a:xfrm>
+          <a:prstGeom prst="roundRect">
+            <a:avLst>
+              <a:gd name="adj" fmla="val 50000"/>
+            </a:avLst>
+          </a:prstGeom>
+          <a:solidFill>
+            <a:srgbClr val="BF39A0"/>
+          </a:solidFill>
+          <a:ln>
+            <a:noFill/>
+          </a:ln>
+          <a:effectLst>
+            <a:softEdge rad="0"/>
+          </a:effectLst>
+        </p:spPr>
+        <p:style>
+          <a:lnRef idx="2">
+            <a:schemeClr val="accent1">
+              <a:shade val="50000"/>
+            </a:schemeClr>
+          </a:lnRef>
+          <a:fillRef idx="1">
+            <a:schemeClr val="accent1"/>
+          </a:fillRef>
+          <a:effectRef idx="0">
+            <a:schemeClr val="accent1"/>
+          </a:effectRef>
+          <a:fontRef idx="minor">
+            <a:schemeClr val="lt1"/>
+          </a:fontRef>
+        </p:style>
+        <p:txBody>
+          <a:bodyPr rtlCol="0" anchor="ctr"/>
+          <a:lstStyle/>
+          <a:p>
+            <a:pPr algn="ctr"/>
+            <a:r>
+              <a:rPr lang="en-DE" sz="1100" dirty="0"/>
+              <a:t>Trust</a:t>
+            </a:r>
+          </a:p>
+        </p:txBody>
+      </p:sp>
+    </p:spTree>
+    <p:extLst>
+      <p:ext uri="{BB962C8B-B14F-4D97-AF65-F5344CB8AC3E}">
+        <p14:creationId xmlns:p14="http://schemas.microsoft.com/office/powerpoint/2010/main" val="2007016596"/>
+      </p:ext>
+    </p:extLst>
+  </p:cSld>
+  <p:clrMapOvr>
+    <a:masterClrMapping/>
+  </p:clrMapOvr>
+</p:sld>
+</file>
+
 <file path=ppt/theme/theme1.xml><?xml version="1.0" encoding="utf-8"?>
 <a:theme xmlns:a="http://schemas.openxmlformats.org/drawingml/2006/main" name="Office Theme">
   <a:themeElements>
@@ -7669,4 +9228,299 @@
     </a:ext>
   </a:extLst>
 </a:theme>
+</file>
+
+<file path=ppt/theme/theme2.xml><?xml version="1.0" encoding="utf-8"?>
+<a:theme xmlns:a="http://schemas.openxmlformats.org/drawingml/2006/main" name="Office Theme">
+  <a:themeElements>
+    <a:clrScheme name="Office">
+      <a:dk1>
+        <a:sysClr val="windowText" lastClr="000000"/>
+      </a:dk1>
+      <a:lt1>
+        <a:sysClr val="window" lastClr="FFFFFF"/>
+      </a:lt1>
+      <a:dk2>
+        <a:srgbClr val="44546A"/>
+      </a:dk2>
+      <a:lt2>
+        <a:srgbClr val="E7E6E6"/>
+      </a:lt2>
+      <a:accent1>
+        <a:srgbClr val="4472C4"/>
+      </a:accent1>
+      <a:accent2>
+        <a:srgbClr val="ED7D31"/>
+      </a:accent2>
+      <a:accent3>
+        <a:srgbClr val="A5A5A5"/>
+      </a:accent3>
+      <a:accent4>
+        <a:srgbClr val="FFC000"/>
+      </a:accent4>
+      <a:accent5>
+        <a:srgbClr val="5B9BD5"/>
+      </a:accent5>
+      <a:accent6>
+        <a:srgbClr val="70AD47"/>
+      </a:accent6>
+      <a:hlink>
+        <a:srgbClr val="0563C1"/>
+      </a:hlink>
+      <a:folHlink>
+        <a:srgbClr val="954F72"/>
+      </a:folHlink>
+    </a:clrScheme>
+    <a:fontScheme name="Office">
+      <a:majorFont>
+        <a:latin typeface="Calibri Light" panose="020F0302020204030204"/>
+        <a:ea typeface=""/>
+        <a:cs typeface=""/>
+        <a:font script="Jpan" typeface="游ゴシック Light"/>
+        <a:font script="Hang" typeface="맑은 고딕"/>
+        <a:font script="Hans" typeface="等线 Light"/>
+        <a:font script="Hant" typeface="新細明體"/>
+        <a:font script="Arab" typeface="Times New Roman"/>
+        <a:font script="Hebr" typeface="Times New Roman"/>
+        <a:font script="Thai" typeface="Angsana New"/>
+        <a:font script="Ethi" typeface="Nyala"/>
+        <a:font script="Beng" typeface="Vrinda"/>
+        <a:font script="Gujr" typeface="Shruti"/>
+        <a:font script="Khmr" typeface="MoolBoran"/>
+        <a:font script="Knda" typeface="Tunga"/>
+        <a:font script="Guru" typeface="Raavi"/>
+        <a:font script="Cans" typeface="Euphemia"/>
+        <a:font script="Cher" typeface="Plantagenet Cherokee"/>
+        <a:font script="Yiii" typeface="Microsoft Yi Baiti"/>
+        <a:font script="Tibt" typeface="Microsoft Himalaya"/>
+        <a:font script="Thaa" typeface="MV Boli"/>
+        <a:font script="Deva" typeface="Mangal"/>
+        <a:font script="Telu" typeface="Gautami"/>
+        <a:font script="Taml" typeface="Latha"/>
+        <a:font script="Syrc" typeface="Estrangelo Edessa"/>
+        <a:font script="Orya" typeface="Kalinga"/>
+        <a:font script="Mlym" typeface="Kartika"/>
+        <a:font script="Laoo" typeface="DokChampa"/>
+        <a:font script="Sinh" typeface="Iskoola Pota"/>
+        <a:font script="Mong" typeface="Mongolian Baiti"/>
+        <a:font script="Viet" typeface="Times New Roman"/>
+        <a:font script="Uigh" typeface="Microsoft Uighur"/>
+        <a:font script="Geor" typeface="Sylfaen"/>
+        <a:font script="Armn" typeface="Arial"/>
+        <a:font script="Bugi" typeface="Leelawadee UI"/>
+        <a:font script="Bopo" typeface="Microsoft JhengHei"/>
+        <a:font script="Java" typeface="Javanese Text"/>
+        <a:font script="Lisu" typeface="Segoe UI"/>
+        <a:font script="Mymr" typeface="Myanmar Text"/>
+        <a:font script="Nkoo" typeface="Ebrima"/>
+        <a:font script="Olck" typeface="Nirmala UI"/>
+        <a:font script="Osma" typeface="Ebrima"/>
+        <a:font script="Phag" typeface="Phagspa"/>
+        <a:font script="Syrn" typeface="Estrangelo Edessa"/>
+        <a:font script="Syrj" typeface="Estrangelo Edessa"/>
+        <a:font script="Syre" typeface="Estrangelo Edessa"/>
+        <a:font script="Sora" typeface="Nirmala UI"/>
+        <a:font script="Tale" typeface="Microsoft Tai Le"/>
+        <a:font script="Talu" typeface="Microsoft New Tai Lue"/>
+        <a:font script="Tfng" typeface="Ebrima"/>
+      </a:majorFont>
+      <a:minorFont>
+        <a:latin typeface="Calibri" panose="020F0502020204030204"/>
+        <a:ea typeface=""/>
+        <a:cs typeface=""/>
+        <a:font script="Jpan" typeface="游ゴシック"/>
+        <a:font script="Hang" typeface="맑은 고딕"/>
+        <a:font script="Hans" typeface="等线"/>
+        <a:font script="Hant" typeface="新細明體"/>
+        <a:font script="Arab" typeface="Arial"/>
+        <a:font script="Hebr" typeface="Arial"/>
+        <a:font script="Thai" typeface="Cordia New"/>
+        <a:font script="Ethi" typeface="Nyala"/>
+        <a:font script="Beng" typeface="Vrinda"/>
+        <a:font script="Gujr" typeface="Shruti"/>
+        <a:font script="Khmr" typeface="DaunPenh"/>
+        <a:font script="Knda" typeface="Tunga"/>
+        <a:font script="Guru" typeface="Raavi"/>
+        <a:font script="Cans" typeface="Euphemia"/>
+        <a:font script="Cher" typeface="Plantagenet Cherokee"/>
+        <a:font script="Yiii" typeface="Microsoft Yi Baiti"/>
+        <a:font script="Tibt" typeface="Microsoft Himalaya"/>
+        <a:font script="Thaa" typeface="MV Boli"/>
+        <a:font script="Deva" typeface="Mangal"/>
+        <a:font script="Telu" typeface="Gautami"/>
+        <a:font script="Taml" typeface="Latha"/>
+        <a:font script="Syrc" typeface="Estrangelo Edessa"/>
+        <a:font script="Orya" typeface="Kalinga"/>
+        <a:font script="Mlym" typeface="Kartika"/>
+        <a:font script="Laoo" typeface="DokChampa"/>
+        <a:font script="Sinh" typeface="Iskoola Pota"/>
+        <a:font script="Mong" typeface="Mongolian Baiti"/>
+        <a:font script="Viet" typeface="Arial"/>
+        <a:font script="Uigh" typeface="Microsoft Uighur"/>
+        <a:font script="Geor" typeface="Sylfaen"/>
+        <a:font script="Armn" typeface="Arial"/>
+        <a:font script="Bugi" typeface="Leelawadee UI"/>
+        <a:font script="Bopo" typeface="Microsoft JhengHei"/>
+        <a:font script="Java" typeface="Javanese Text"/>
+        <a:font script="Lisu" typeface="Segoe UI"/>
+        <a:font script="Mymr" typeface="Myanmar Text"/>
+        <a:font script="Nkoo" typeface="Ebrima"/>
+        <a:font script="Olck" typeface="Nirmala UI"/>
+        <a:font script="Osma" typeface="Ebrima"/>
+        <a:font script="Phag" typeface="Phagspa"/>
+        <a:font script="Syrn" typeface="Estrangelo Edessa"/>
+        <a:font script="Syrj" typeface="Estrangelo Edessa"/>
+        <a:font script="Syre" typeface="Estrangelo Edessa"/>
+        <a:font script="Sora" typeface="Nirmala UI"/>
+        <a:font script="Tale" typeface="Microsoft Tai Le"/>
+        <a:font script="Talu" typeface="Microsoft New Tai Lue"/>
+        <a:font script="Tfng" typeface="Ebrima"/>
+      </a:minorFont>
+    </a:fontScheme>
+    <a:fmtScheme name="Office">
+      <a:fillStyleLst>
+        <a:solidFill>
+          <a:schemeClr val="phClr"/>
+        </a:solidFill>
+        <a:gradFill rotWithShape="1">
+          <a:gsLst>
+            <a:gs pos="0">
+              <a:schemeClr val="phClr">
+                <a:lumMod val="110000"/>
+                <a:satMod val="105000"/>
+                <a:tint val="67000"/>
+              </a:schemeClr>
+            </a:gs>
+            <a:gs pos="50000">
+              <a:schemeClr val="phClr">
+                <a:lumMod val="105000"/>
+                <a:satMod val="103000"/>
+                <a:tint val="73000"/>
+              </a:schemeClr>
+            </a:gs>
+            <a:gs pos="100000">
+              <a:schemeClr val="phClr">
+                <a:lumMod val="105000"/>
+                <a:satMod val="109000"/>
+                <a:tint val="81000"/>
+              </a:schemeClr>
+            </a:gs>
+          </a:gsLst>
+          <a:lin ang="5400000" scaled="0"/>
+        </a:gradFill>
+        <a:gradFill rotWithShape="1">
+          <a:gsLst>
+            <a:gs pos="0">
+              <a:schemeClr val="phClr">
+                <a:satMod val="103000"/>
+                <a:lumMod val="102000"/>
+                <a:tint val="94000"/>
+              </a:schemeClr>
+            </a:gs>
+            <a:gs pos="50000">
+              <a:schemeClr val="phClr">
+                <a:satMod val="110000"/>
+                <a:lumMod val="100000"/>
+                <a:shade val="100000"/>
+              </a:schemeClr>
+            </a:gs>
+            <a:gs pos="100000">
+              <a:schemeClr val="phClr">
+                <a:lumMod val="99000"/>
+                <a:satMod val="120000"/>
+                <a:shade val="78000"/>
+              </a:schemeClr>
+            </a:gs>
+          </a:gsLst>
+          <a:lin ang="5400000" scaled="0"/>
+        </a:gradFill>
+      </a:fillStyleLst>
+      <a:lnStyleLst>
+        <a:ln w="6350" cap="flat" cmpd="sng" algn="ctr">
+          <a:solidFill>
+            <a:schemeClr val="phClr"/>
+          </a:solidFill>
+          <a:prstDash val="solid"/>
+          <a:miter lim="800000"/>
+        </a:ln>
+        <a:ln w="12700" cap="flat" cmpd="sng" algn="ctr">
+          <a:solidFill>
+            <a:schemeClr val="phClr"/>
+          </a:solidFill>
+          <a:prstDash val="solid"/>
+          <a:miter lim="800000"/>
+        </a:ln>
+        <a:ln w="19050" cap="flat" cmpd="sng" algn="ctr">
+          <a:solidFill>
+            <a:schemeClr val="phClr"/>
+          </a:solidFill>
+          <a:prstDash val="solid"/>
+          <a:miter lim="800000"/>
+        </a:ln>
+      </a:lnStyleLst>
+      <a:effectStyleLst>
+        <a:effectStyle>
+          <a:effectLst/>
+        </a:effectStyle>
+        <a:effectStyle>
+          <a:effectLst/>
+        </a:effectStyle>
+        <a:effectStyle>
+          <a:effectLst>
+            <a:outerShdw blurRad="57150" dist="19050" dir="5400000" algn="ctr" rotWithShape="0">
+              <a:srgbClr val="000000">
+                <a:alpha val="63000"/>
+              </a:srgbClr>
+            </a:outerShdw>
+          </a:effectLst>
+        </a:effectStyle>
+      </a:effectStyleLst>
+      <a:bgFillStyleLst>
+        <a:solidFill>
+          <a:schemeClr val="phClr"/>
+        </a:solidFill>
+        <a:solidFill>
+          <a:schemeClr val="phClr">
+            <a:tint val="95000"/>
+            <a:satMod val="170000"/>
+          </a:schemeClr>
+        </a:solidFill>
+        <a:gradFill rotWithShape="1">
+          <a:gsLst>
+            <a:gs pos="0">
+              <a:schemeClr val="phClr">
+                <a:tint val="93000"/>
+                <a:satMod val="150000"/>
+                <a:shade val="98000"/>
+                <a:lumMod val="102000"/>
+              </a:schemeClr>
+            </a:gs>
+            <a:gs pos="50000">
+              <a:schemeClr val="phClr">
+                <a:tint val="98000"/>
+                <a:satMod val="130000"/>
+                <a:shade val="90000"/>
+                <a:lumMod val="103000"/>
+              </a:schemeClr>
+            </a:gs>
+            <a:gs pos="100000">
+              <a:schemeClr val="phClr">
+                <a:shade val="63000"/>
+                <a:satMod val="120000"/>
+              </a:schemeClr>
+            </a:gs>
+          </a:gsLst>
+          <a:lin ang="5400000" scaled="0"/>
+        </a:gradFill>
+      </a:bgFillStyleLst>
+    </a:fmtScheme>
+  </a:themeElements>
+  <a:objectDefaults/>
+  <a:extraClrSchemeLst/>
+  <a:extLst>
+    <a:ext uri="{05A4C25C-085E-4340-85A3-A5531E510DB2}">
+      <thm15:themeFamily xmlns:thm15="http://schemas.microsoft.com/office/thememl/2012/main" name="Office Theme" id="{62F939B6-93AF-4DB8-9C6B-D6C7DFDC589F}" vid="{4A3C46E8-61CC-4603-A589-7422A47A8E4A}"/>
+    </a:ext>
+  </a:extLst>
+</a:theme>
 </file>
</xml_diff>

<commit_message>
update Solution Diagrams to reflect SAP HANA multicloud
</commit_message>
<xml_diff>
--- a/documentation/images/easyfranchise-identity-diagrams.pptx
+++ b/documentation/images/easyfranchise-identity-diagrams.pptx
@@ -202,7 +202,7 @@
           <a:p>
             <a:fld id="{405AB75F-762F-7444-9F21-EA1C7BD0BBDF}" type="datetimeFigureOut">
               <a:rPr lang="en-DE" smtClean="0"/>
-              <a:t>11.07.22</a:t>
+              <a:t>17/02/2023</a:t>
             </a:fld>
             <a:endParaRPr lang="en-DE"/>
           </a:p>
@@ -703,7 +703,7 @@
           <a:p>
             <a:fld id="{11055433-DDDA-1147-A71A-BE0AE55CB161}" type="datetimeFigureOut">
               <a:rPr lang="en-DE" smtClean="0"/>
-              <a:t>11.07.22</a:t>
+              <a:t>17/02/2023</a:t>
             </a:fld>
             <a:endParaRPr lang="en-DE"/>
           </a:p>
@@ -903,7 +903,7 @@
           <a:p>
             <a:fld id="{11055433-DDDA-1147-A71A-BE0AE55CB161}" type="datetimeFigureOut">
               <a:rPr lang="en-DE" smtClean="0"/>
-              <a:t>11.07.22</a:t>
+              <a:t>17/02/2023</a:t>
             </a:fld>
             <a:endParaRPr lang="en-DE"/>
           </a:p>
@@ -1113,7 +1113,7 @@
           <a:p>
             <a:fld id="{11055433-DDDA-1147-A71A-BE0AE55CB161}" type="datetimeFigureOut">
               <a:rPr lang="en-DE" smtClean="0"/>
-              <a:t>11.07.22</a:t>
+              <a:t>17/02/2023</a:t>
             </a:fld>
             <a:endParaRPr lang="en-DE"/>
           </a:p>
@@ -1419,7 +1419,7 @@
           <a:p>
             <a:fld id="{11055433-DDDA-1147-A71A-BE0AE55CB161}" type="datetimeFigureOut">
               <a:rPr lang="en-DE" smtClean="0"/>
-              <a:t>11.07.22</a:t>
+              <a:t>17/02/2023</a:t>
             </a:fld>
             <a:endParaRPr lang="en-DE"/>
           </a:p>
@@ -1687,7 +1687,7 @@
           <a:p>
             <a:fld id="{11055433-DDDA-1147-A71A-BE0AE55CB161}" type="datetimeFigureOut">
               <a:rPr lang="en-DE" smtClean="0"/>
-              <a:t>11.07.22</a:t>
+              <a:t>17/02/2023</a:t>
             </a:fld>
             <a:endParaRPr lang="en-DE"/>
           </a:p>
@@ -2102,7 +2102,7 @@
           <a:p>
             <a:fld id="{11055433-DDDA-1147-A71A-BE0AE55CB161}" type="datetimeFigureOut">
               <a:rPr lang="en-DE" smtClean="0"/>
-              <a:t>11.07.22</a:t>
+              <a:t>17/02/2023</a:t>
             </a:fld>
             <a:endParaRPr lang="en-DE"/>
           </a:p>
@@ -2244,7 +2244,7 @@
           <a:p>
             <a:fld id="{11055433-DDDA-1147-A71A-BE0AE55CB161}" type="datetimeFigureOut">
               <a:rPr lang="en-DE" smtClean="0"/>
-              <a:t>11.07.22</a:t>
+              <a:t>17/02/2023</a:t>
             </a:fld>
             <a:endParaRPr lang="en-DE"/>
           </a:p>
@@ -2357,7 +2357,7 @@
           <a:p>
             <a:fld id="{11055433-DDDA-1147-A71A-BE0AE55CB161}" type="datetimeFigureOut">
               <a:rPr lang="en-DE" smtClean="0"/>
-              <a:t>11.07.22</a:t>
+              <a:t>17/02/2023</a:t>
             </a:fld>
             <a:endParaRPr lang="en-DE"/>
           </a:p>
@@ -2670,7 +2670,7 @@
           <a:p>
             <a:fld id="{11055433-DDDA-1147-A71A-BE0AE55CB161}" type="datetimeFigureOut">
               <a:rPr lang="en-DE" smtClean="0"/>
-              <a:t>11.07.22</a:t>
+              <a:t>17/02/2023</a:t>
             </a:fld>
             <a:endParaRPr lang="en-DE"/>
           </a:p>
@@ -2959,7 +2959,7 @@
           <a:p>
             <a:fld id="{11055433-DDDA-1147-A71A-BE0AE55CB161}" type="datetimeFigureOut">
               <a:rPr lang="en-DE" smtClean="0"/>
-              <a:t>11.07.22</a:t>
+              <a:t>17/02/2023</a:t>
             </a:fld>
             <a:endParaRPr lang="en-DE"/>
           </a:p>
@@ -3202,7 +3202,7 @@
           <a:p>
             <a:fld id="{11055433-DDDA-1147-A71A-BE0AE55CB161}" type="datetimeFigureOut">
               <a:rPr lang="en-DE" smtClean="0"/>
-              <a:t>11.07.22</a:t>
+              <a:t>17/02/2023</a:t>
             </a:fld>
             <a:endParaRPr lang="en-DE"/>
           </a:p>
@@ -4786,53 +4786,6 @@
           </a:p>
         </p:txBody>
       </p:sp>
-      <p:pic>
-        <p:nvPicPr>
-          <p:cNvPr id="1028" name="Picture 4" descr="Cloud Foundry – Open Source Cloud Native Application Delivery">
-            <a:extLst>
-              <a:ext uri="{FF2B5EF4-FFF2-40B4-BE49-F238E27FC236}">
-                <a16:creationId xmlns:a16="http://schemas.microsoft.com/office/drawing/2014/main" id="{CBEBA09B-CC6D-5448-9FCE-CEB7170E6C16}"/>
-              </a:ext>
-            </a:extLst>
-          </p:cNvPr>
-          <p:cNvPicPr>
-            <a:picLocks noChangeAspect="1" noChangeArrowheads="1"/>
-          </p:cNvPicPr>
-          <p:nvPr/>
-        </p:nvPicPr>
-        <p:blipFill>
-          <a:blip r:embed="rId4">
-            <a:extLst>
-              <a:ext uri="{28A0092B-C50C-407E-A947-70E740481C1C}">
-                <a14:useLocalDpi xmlns:a14="http://schemas.microsoft.com/office/drawing/2010/main" val="0"/>
-              </a:ext>
-            </a:extLst>
-          </a:blip>
-          <a:srcRect/>
-          <a:stretch>
-            <a:fillRect/>
-          </a:stretch>
-        </p:blipFill>
-        <p:spPr bwMode="auto">
-          <a:xfrm>
-            <a:off x="6482349" y="1602012"/>
-            <a:ext cx="1063096" cy="145345"/>
-          </a:xfrm>
-          <a:prstGeom prst="rect">
-            <a:avLst/>
-          </a:prstGeom>
-          <a:noFill/>
-          <a:extLst>
-            <a:ext uri="{909E8E84-426E-40DD-AFC4-6F175D3DCCD1}">
-              <a14:hiddenFill xmlns:a14="http://schemas.microsoft.com/office/drawing/2010/main">
-                <a:solidFill>
-                  <a:srgbClr val="FFFFFF"/>
-                </a:solidFill>
-              </a14:hiddenFill>
-            </a:ext>
-          </a:extLst>
-        </p:spPr>
-      </p:pic>
       <p:sp>
         <p:nvSpPr>
           <p:cNvPr id="25" name="Rectangle 24">
@@ -5675,7 +5628,7 @@
           <p:nvPr/>
         </p:nvPicPr>
         <p:blipFill>
-          <a:blip r:embed="rId5">
+          <a:blip r:embed="rId4">
             <a:extLst>
               <a:ext uri="{28A0092B-C50C-407E-A947-70E740481C1C}">
                 <a14:useLocalDpi xmlns:a14="http://schemas.microsoft.com/office/drawing/2010/main" val="0"/>
@@ -5722,7 +5675,7 @@
           <p:nvPr/>
         </p:nvPicPr>
         <p:blipFill>
-          <a:blip r:embed="rId5">
+          <a:blip r:embed="rId4">
             <a:extLst>
               <a:ext uri="{28A0092B-C50C-407E-A947-70E740481C1C}">
                 <a14:useLocalDpi xmlns:a14="http://schemas.microsoft.com/office/drawing/2010/main" val="0"/>
@@ -5769,7 +5722,7 @@
           <p:nvPr/>
         </p:nvPicPr>
         <p:blipFill>
-          <a:blip r:embed="rId6">
+          <a:blip r:embed="rId5">
             <a:extLst>
               <a:ext uri="{28A0092B-C50C-407E-A947-70E740481C1C}">
                 <a14:useLocalDpi xmlns:a14="http://schemas.microsoft.com/office/drawing/2010/main" val="0"/>
@@ -5878,7 +5831,7 @@
         <p:spPr>
           <a:xfrm>
             <a:off x="6557325" y="1943462"/>
-            <a:ext cx="894797" cy="215444"/>
+            <a:ext cx="947695" cy="215444"/>
           </a:xfrm>
           <a:prstGeom prst="rect">
             <a:avLst/>
@@ -5892,7 +5845,7 @@
           <a:lstStyle/>
           <a:p>
             <a:r>
-              <a:rPr lang="en-DE" sz="800" b="1" dirty="0">
+              <a:rPr lang="en-US" sz="800" b="1" dirty="0">
                 <a:solidFill>
                   <a:schemeClr val="tx1">
                     <a:lumMod val="50000"/>
@@ -5900,8 +5853,16 @@
                   </a:schemeClr>
                 </a:solidFill>
               </a:rPr>
-              <a:t>SAP HANA Cloud</a:t>
-            </a:r>
+              <a:t>Easy Franchise DB</a:t>
+            </a:r>
+            <a:endParaRPr lang="en-DE" sz="800" b="1" dirty="0">
+              <a:solidFill>
+                <a:schemeClr val="tx1">
+                  <a:lumMod val="50000"/>
+                  <a:lumOff val="50000"/>
+                </a:schemeClr>
+              </a:solidFill>
+            </a:endParaRPr>
           </a:p>
         </p:txBody>
       </p:sp>
@@ -5920,7 +5881,7 @@
           <p:nvPr/>
         </p:nvPicPr>
         <p:blipFill>
-          <a:blip r:embed="rId7">
+          <a:blip r:embed="rId6">
             <a:duotone>
               <a:prstClr val="black"/>
               <a:schemeClr val="accent3">
@@ -5974,7 +5935,7 @@
           <p:nvPr/>
         </p:nvPicPr>
         <p:blipFill>
-          <a:blip r:embed="rId7">
+          <a:blip r:embed="rId6">
             <a:duotone>
               <a:prstClr val="black"/>
               <a:schemeClr val="accent3">
@@ -6028,7 +5989,7 @@
           <p:nvPr/>
         </p:nvPicPr>
         <p:blipFill>
-          <a:blip r:embed="rId7">
+          <a:blip r:embed="rId6">
             <a:duotone>
               <a:prstClr val="black"/>
               <a:schemeClr val="accent3">
@@ -6082,7 +6043,7 @@
           <p:nvPr/>
         </p:nvPicPr>
         <p:blipFill>
-          <a:blip r:embed="rId7">
+          <a:blip r:embed="rId6">
             <a:duotone>
               <a:prstClr val="black"/>
               <a:schemeClr val="accent3">
@@ -7286,7 +7247,7 @@
           <p:nvPr/>
         </p:nvPicPr>
         <p:blipFill>
-          <a:blip r:embed="rId8">
+          <a:blip r:embed="rId7">
             <a:extLst>
               <a:ext uri="{28A0092B-C50C-407E-A947-70E740481C1C}">
                 <a14:useLocalDpi xmlns:a14="http://schemas.microsoft.com/office/drawing/2010/main" val="0"/>
@@ -7522,7 +7483,7 @@
           <p:nvPr/>
         </p:nvPicPr>
         <p:blipFill>
-          <a:blip r:embed="rId9">
+          <a:blip r:embed="rId8">
             <a:extLst>
               <a:ext uri="{28A0092B-C50C-407E-A947-70E740481C1C}">
                 <a14:useLocalDpi xmlns:a14="http://schemas.microsoft.com/office/drawing/2010/main" val="0"/>
@@ -7569,7 +7530,7 @@
           <p:nvPr/>
         </p:nvPicPr>
         <p:blipFill>
-          <a:blip r:embed="rId5">
+          <a:blip r:embed="rId4">
             <a:extLst>
               <a:ext uri="{28A0092B-C50C-407E-A947-70E740481C1C}">
                 <a14:useLocalDpi xmlns:a14="http://schemas.microsoft.com/office/drawing/2010/main" val="0"/>
@@ -7801,6 +7762,50 @@
               </a:rPr>
               <a:t>10</a:t>
             </a:r>
+          </a:p>
+        </p:txBody>
+      </p:sp>
+      <p:sp>
+        <p:nvSpPr>
+          <p:cNvPr id="77" name="TextBox 76">
+            <a:extLst>
+              <a:ext uri="{FF2B5EF4-FFF2-40B4-BE49-F238E27FC236}">
+                <a16:creationId xmlns:a16="http://schemas.microsoft.com/office/drawing/2014/main" id="{7FEA88B8-EAA3-485C-A7FD-A959F4C073C6}"/>
+              </a:ext>
+            </a:extLst>
+          </p:cNvPr>
+          <p:cNvSpPr txBox="1"/>
+          <p:nvPr/>
+        </p:nvSpPr>
+        <p:spPr>
+          <a:xfrm>
+            <a:off x="6443895" y="1572048"/>
+            <a:ext cx="2647483" cy="246221"/>
+          </a:xfrm>
+          <a:prstGeom prst="rect">
+            <a:avLst/>
+          </a:prstGeom>
+          <a:noFill/>
+        </p:spPr>
+        <p:txBody>
+          <a:bodyPr wrap="square" rtlCol="0">
+            <a:spAutoFit/>
+          </a:bodyPr>
+          <a:lstStyle/>
+          <a:p>
+            <a:r>
+              <a:rPr lang="en-US" sz="1000" b="1" dirty="0">
+                <a:solidFill>
+                  <a:srgbClr val="5B9BD5"/>
+                </a:solidFill>
+              </a:rPr>
+              <a:t>SAP HANA Cloud</a:t>
+            </a:r>
+            <a:endParaRPr lang="de-DE" sz="1000" b="1" dirty="0">
+              <a:solidFill>
+                <a:srgbClr val="5B9BD5"/>
+              </a:solidFill>
+            </a:endParaRPr>
           </a:p>
         </p:txBody>
       </p:sp>
@@ -7864,6 +7869,104 @@
           </a:prstGeom>
         </p:spPr>
       </p:pic>
+      <p:sp>
+        <p:nvSpPr>
+          <p:cNvPr id="8" name="TextBox 7">
+            <a:extLst>
+              <a:ext uri="{FF2B5EF4-FFF2-40B4-BE49-F238E27FC236}">
+                <a16:creationId xmlns:a16="http://schemas.microsoft.com/office/drawing/2014/main" id="{BF2007BE-1F4E-40CD-8F84-71112602780B}"/>
+              </a:ext>
+            </a:extLst>
+          </p:cNvPr>
+          <p:cNvSpPr txBox="1"/>
+          <p:nvPr/>
+        </p:nvSpPr>
+        <p:spPr>
+          <a:xfrm>
+            <a:off x="1931987" y="3379827"/>
+            <a:ext cx="1497013" cy="276999"/>
+          </a:xfrm>
+          <a:prstGeom prst="rect">
+            <a:avLst/>
+          </a:prstGeom>
+          <a:solidFill>
+            <a:srgbClr val="DEEAF6"/>
+          </a:solidFill>
+        </p:spPr>
+        <p:txBody>
+          <a:bodyPr wrap="square">
+            <a:spAutoFit/>
+          </a:bodyPr>
+          <a:lstStyle/>
+          <a:p>
+            <a:r>
+              <a:rPr lang="en-US" sz="1200" b="1" dirty="0">
+                <a:solidFill>
+                  <a:srgbClr val="1B4F84"/>
+                </a:solidFill>
+              </a:rPr>
+              <a:t>SAP HANA Cloud</a:t>
+            </a:r>
+            <a:endParaRPr lang="de-DE" sz="1200" b="1" dirty="0">
+              <a:solidFill>
+                <a:srgbClr val="1B4F84"/>
+              </a:solidFill>
+            </a:endParaRPr>
+          </a:p>
+        </p:txBody>
+      </p:sp>
+      <p:sp>
+        <p:nvSpPr>
+          <p:cNvPr id="7" name="TextBox 6">
+            <a:extLst>
+              <a:ext uri="{FF2B5EF4-FFF2-40B4-BE49-F238E27FC236}">
+                <a16:creationId xmlns:a16="http://schemas.microsoft.com/office/drawing/2014/main" id="{0F6BC12E-7D3B-403A-AD15-E21DFC2BF3C8}"/>
+              </a:ext>
+            </a:extLst>
+          </p:cNvPr>
+          <p:cNvSpPr txBox="1"/>
+          <p:nvPr/>
+        </p:nvSpPr>
+        <p:spPr>
+          <a:xfrm>
+            <a:off x="2755900" y="3848100"/>
+            <a:ext cx="1497012" cy="276999"/>
+          </a:xfrm>
+          <a:prstGeom prst="rect">
+            <a:avLst/>
+          </a:prstGeom>
+          <a:solidFill>
+            <a:schemeClr val="bg1"/>
+          </a:solidFill>
+        </p:spPr>
+        <p:txBody>
+          <a:bodyPr wrap="square" rtlCol="0">
+            <a:spAutoFit/>
+          </a:bodyPr>
+          <a:lstStyle/>
+          <a:p>
+            <a:r>
+              <a:rPr lang="en-US" sz="1200" b="1" dirty="0">
+                <a:solidFill>
+                  <a:schemeClr val="tx1">
+                    <a:lumMod val="50000"/>
+                    <a:lumOff val="50000"/>
+                  </a:schemeClr>
+                </a:solidFill>
+              </a:rPr>
+              <a:t>Easy Franchise DB</a:t>
+            </a:r>
+            <a:endParaRPr lang="en-DE" sz="1200" b="1" dirty="0">
+              <a:solidFill>
+                <a:schemeClr val="tx1">
+                  <a:lumMod val="50000"/>
+                  <a:lumOff val="50000"/>
+                </a:schemeClr>
+              </a:solidFill>
+            </a:endParaRPr>
+          </a:p>
+        </p:txBody>
+      </p:sp>
     </p:spTree>
     <p:extLst>
       <p:ext uri="{BB962C8B-B14F-4D97-AF65-F5344CB8AC3E}">
@@ -7924,6 +8027,104 @@
           </a:prstGeom>
         </p:spPr>
       </p:pic>
+      <p:sp>
+        <p:nvSpPr>
+          <p:cNvPr id="3" name="TextBox 2">
+            <a:extLst>
+              <a:ext uri="{FF2B5EF4-FFF2-40B4-BE49-F238E27FC236}">
+                <a16:creationId xmlns:a16="http://schemas.microsoft.com/office/drawing/2014/main" id="{53DE44AF-7788-4226-9FD2-D9FC9CC04365}"/>
+              </a:ext>
+            </a:extLst>
+          </p:cNvPr>
+          <p:cNvSpPr txBox="1"/>
+          <p:nvPr/>
+        </p:nvSpPr>
+        <p:spPr>
+          <a:xfrm>
+            <a:off x="1931987" y="3379827"/>
+            <a:ext cx="1497013" cy="276999"/>
+          </a:xfrm>
+          <a:prstGeom prst="rect">
+            <a:avLst/>
+          </a:prstGeom>
+          <a:solidFill>
+            <a:srgbClr val="DEEAF6"/>
+          </a:solidFill>
+        </p:spPr>
+        <p:txBody>
+          <a:bodyPr wrap="square">
+            <a:spAutoFit/>
+          </a:bodyPr>
+          <a:lstStyle/>
+          <a:p>
+            <a:r>
+              <a:rPr lang="en-US" sz="1200" b="1" dirty="0">
+                <a:solidFill>
+                  <a:srgbClr val="1B4F84"/>
+                </a:solidFill>
+              </a:rPr>
+              <a:t>SAP HANA Cloud</a:t>
+            </a:r>
+            <a:endParaRPr lang="de-DE" sz="1200" b="1" dirty="0">
+              <a:solidFill>
+                <a:srgbClr val="1B4F84"/>
+              </a:solidFill>
+            </a:endParaRPr>
+          </a:p>
+        </p:txBody>
+      </p:sp>
+      <p:sp>
+        <p:nvSpPr>
+          <p:cNvPr id="4" name="TextBox 3">
+            <a:extLst>
+              <a:ext uri="{FF2B5EF4-FFF2-40B4-BE49-F238E27FC236}">
+                <a16:creationId xmlns:a16="http://schemas.microsoft.com/office/drawing/2014/main" id="{4A358844-D493-42BC-A1D9-BEEDE4DD1778}"/>
+              </a:ext>
+            </a:extLst>
+          </p:cNvPr>
+          <p:cNvSpPr txBox="1"/>
+          <p:nvPr/>
+        </p:nvSpPr>
+        <p:spPr>
+          <a:xfrm>
+            <a:off x="2755900" y="3848100"/>
+            <a:ext cx="1497012" cy="276999"/>
+          </a:xfrm>
+          <a:prstGeom prst="rect">
+            <a:avLst/>
+          </a:prstGeom>
+          <a:solidFill>
+            <a:schemeClr val="bg1"/>
+          </a:solidFill>
+        </p:spPr>
+        <p:txBody>
+          <a:bodyPr wrap="square" rtlCol="0">
+            <a:spAutoFit/>
+          </a:bodyPr>
+          <a:lstStyle/>
+          <a:p>
+            <a:r>
+              <a:rPr lang="en-US" sz="1200" b="1" dirty="0">
+                <a:solidFill>
+                  <a:schemeClr val="tx1">
+                    <a:lumMod val="50000"/>
+                    <a:lumOff val="50000"/>
+                  </a:schemeClr>
+                </a:solidFill>
+              </a:rPr>
+              <a:t>Easy Franchise DB</a:t>
+            </a:r>
+            <a:endParaRPr lang="en-DE" sz="1200" b="1" dirty="0">
+              <a:solidFill>
+                <a:schemeClr val="tx1">
+                  <a:lumMod val="50000"/>
+                  <a:lumOff val="50000"/>
+                </a:schemeClr>
+              </a:solidFill>
+            </a:endParaRPr>
+          </a:p>
+        </p:txBody>
+      </p:sp>
     </p:spTree>
     <p:extLst>
       <p:ext uri="{BB962C8B-B14F-4D97-AF65-F5344CB8AC3E}">
@@ -8423,6 +8624,104 @@
           </a:p>
         </p:txBody>
       </p:sp>
+      <p:sp>
+        <p:nvSpPr>
+          <p:cNvPr id="10" name="TextBox 9">
+            <a:extLst>
+              <a:ext uri="{FF2B5EF4-FFF2-40B4-BE49-F238E27FC236}">
+                <a16:creationId xmlns:a16="http://schemas.microsoft.com/office/drawing/2014/main" id="{2E2E7714-90B4-4B2B-9695-63DA48366DD0}"/>
+              </a:ext>
+            </a:extLst>
+          </p:cNvPr>
+          <p:cNvSpPr txBox="1"/>
+          <p:nvPr/>
+        </p:nvSpPr>
+        <p:spPr>
+          <a:xfrm>
+            <a:off x="1931987" y="3379827"/>
+            <a:ext cx="1497013" cy="276999"/>
+          </a:xfrm>
+          <a:prstGeom prst="rect">
+            <a:avLst/>
+          </a:prstGeom>
+          <a:solidFill>
+            <a:srgbClr val="DEEAF6"/>
+          </a:solidFill>
+        </p:spPr>
+        <p:txBody>
+          <a:bodyPr wrap="square">
+            <a:spAutoFit/>
+          </a:bodyPr>
+          <a:lstStyle/>
+          <a:p>
+            <a:r>
+              <a:rPr lang="en-US" sz="1200" b="1" dirty="0">
+                <a:solidFill>
+                  <a:srgbClr val="1B4F84"/>
+                </a:solidFill>
+              </a:rPr>
+              <a:t>SAP HANA Cloud</a:t>
+            </a:r>
+            <a:endParaRPr lang="de-DE" sz="1200" b="1" dirty="0">
+              <a:solidFill>
+                <a:srgbClr val="1B4F84"/>
+              </a:solidFill>
+            </a:endParaRPr>
+          </a:p>
+        </p:txBody>
+      </p:sp>
+      <p:sp>
+        <p:nvSpPr>
+          <p:cNvPr id="11" name="TextBox 10">
+            <a:extLst>
+              <a:ext uri="{FF2B5EF4-FFF2-40B4-BE49-F238E27FC236}">
+                <a16:creationId xmlns:a16="http://schemas.microsoft.com/office/drawing/2014/main" id="{DD074535-DD15-4101-82E5-E058746C3C26}"/>
+              </a:ext>
+            </a:extLst>
+          </p:cNvPr>
+          <p:cNvSpPr txBox="1"/>
+          <p:nvPr/>
+        </p:nvSpPr>
+        <p:spPr>
+          <a:xfrm>
+            <a:off x="2755900" y="3848100"/>
+            <a:ext cx="1497012" cy="276999"/>
+          </a:xfrm>
+          <a:prstGeom prst="rect">
+            <a:avLst/>
+          </a:prstGeom>
+          <a:solidFill>
+            <a:schemeClr val="bg1"/>
+          </a:solidFill>
+        </p:spPr>
+        <p:txBody>
+          <a:bodyPr wrap="square" rtlCol="0">
+            <a:spAutoFit/>
+          </a:bodyPr>
+          <a:lstStyle/>
+          <a:p>
+            <a:r>
+              <a:rPr lang="en-US" sz="1200" b="1" dirty="0">
+                <a:solidFill>
+                  <a:schemeClr val="tx1">
+                    <a:lumMod val="50000"/>
+                    <a:lumOff val="50000"/>
+                  </a:schemeClr>
+                </a:solidFill>
+              </a:rPr>
+              <a:t>Easy Franchise DB</a:t>
+            </a:r>
+            <a:endParaRPr lang="en-DE" sz="1200" b="1" dirty="0">
+              <a:solidFill>
+                <a:schemeClr val="tx1">
+                  <a:lumMod val="50000"/>
+                  <a:lumOff val="50000"/>
+                </a:schemeClr>
+              </a:solidFill>
+            </a:endParaRPr>
+          </a:p>
+        </p:txBody>
+      </p:sp>
     </p:spTree>
     <p:extLst>
       <p:ext uri="{BB962C8B-B14F-4D97-AF65-F5344CB8AC3E}">
@@ -8919,6 +9218,104 @@
               <a:rPr lang="en-DE" sz="1100" dirty="0"/>
               <a:t>Trust</a:t>
             </a:r>
+          </a:p>
+        </p:txBody>
+      </p:sp>
+      <p:sp>
+        <p:nvSpPr>
+          <p:cNvPr id="11" name="TextBox 10">
+            <a:extLst>
+              <a:ext uri="{FF2B5EF4-FFF2-40B4-BE49-F238E27FC236}">
+                <a16:creationId xmlns:a16="http://schemas.microsoft.com/office/drawing/2014/main" id="{7B882D78-A6DE-48D1-89FA-DF545776A243}"/>
+              </a:ext>
+            </a:extLst>
+          </p:cNvPr>
+          <p:cNvSpPr txBox="1"/>
+          <p:nvPr/>
+        </p:nvSpPr>
+        <p:spPr>
+          <a:xfrm>
+            <a:off x="1931987" y="3379827"/>
+            <a:ext cx="1497013" cy="276999"/>
+          </a:xfrm>
+          <a:prstGeom prst="rect">
+            <a:avLst/>
+          </a:prstGeom>
+          <a:solidFill>
+            <a:srgbClr val="DEEAF6"/>
+          </a:solidFill>
+        </p:spPr>
+        <p:txBody>
+          <a:bodyPr wrap="square">
+            <a:spAutoFit/>
+          </a:bodyPr>
+          <a:lstStyle/>
+          <a:p>
+            <a:r>
+              <a:rPr lang="en-US" sz="1200" b="1" dirty="0">
+                <a:solidFill>
+                  <a:srgbClr val="1B4F84"/>
+                </a:solidFill>
+              </a:rPr>
+              <a:t>SAP HANA Cloud</a:t>
+            </a:r>
+            <a:endParaRPr lang="de-DE" sz="1200" b="1" dirty="0">
+              <a:solidFill>
+                <a:srgbClr val="1B4F84"/>
+              </a:solidFill>
+            </a:endParaRPr>
+          </a:p>
+        </p:txBody>
+      </p:sp>
+      <p:sp>
+        <p:nvSpPr>
+          <p:cNvPr id="12" name="TextBox 11">
+            <a:extLst>
+              <a:ext uri="{FF2B5EF4-FFF2-40B4-BE49-F238E27FC236}">
+                <a16:creationId xmlns:a16="http://schemas.microsoft.com/office/drawing/2014/main" id="{6C600FDA-1C1B-48C7-9FA7-0D435AA04E99}"/>
+              </a:ext>
+            </a:extLst>
+          </p:cNvPr>
+          <p:cNvSpPr txBox="1"/>
+          <p:nvPr/>
+        </p:nvSpPr>
+        <p:spPr>
+          <a:xfrm>
+            <a:off x="2755900" y="3848100"/>
+            <a:ext cx="1497012" cy="276999"/>
+          </a:xfrm>
+          <a:prstGeom prst="rect">
+            <a:avLst/>
+          </a:prstGeom>
+          <a:solidFill>
+            <a:schemeClr val="bg1"/>
+          </a:solidFill>
+        </p:spPr>
+        <p:txBody>
+          <a:bodyPr wrap="square" rtlCol="0">
+            <a:spAutoFit/>
+          </a:bodyPr>
+          <a:lstStyle/>
+          <a:p>
+            <a:r>
+              <a:rPr lang="en-US" sz="1200" b="1" dirty="0">
+                <a:solidFill>
+                  <a:schemeClr val="tx1">
+                    <a:lumMod val="50000"/>
+                    <a:lumOff val="50000"/>
+                  </a:schemeClr>
+                </a:solidFill>
+              </a:rPr>
+              <a:t>Easy Franchise DB</a:t>
+            </a:r>
+            <a:endParaRPr lang="en-DE" sz="1200" b="1" dirty="0">
+              <a:solidFill>
+                <a:schemeClr val="tx1">
+                  <a:lumMod val="50000"/>
+                  <a:lumOff val="50000"/>
+                </a:schemeClr>
+              </a:solidFill>
+            </a:endParaRPr>
           </a:p>
         </p:txBody>
       </p:sp>

</xml_diff>